<commit_message>
slides: minor revisions ; exercises: pets in python problem added
</commit_message>
<xml_diff>
--- a/slides/imports.pptx
+++ b/slides/imports.pptx
@@ -211,7 +211,7 @@
           <a:p>
             <a:fld id="{4AFF1A39-08FC-A241-8B97-468F53292083}" type="datetimeFigureOut">
               <a:rPr lang="en-US" smtClean="0"/>
-              <a:t>5/12/20</a:t>
+              <a:t>5/15/20</a:t>
             </a:fld>
             <a:endParaRPr lang="en-US"/>
           </a:p>
@@ -479,6 +479,190 @@
 </p:notesMaster>
 </file>
 
+<file path=ppt/notesSlides/notesSlide1.xml><?xml version="1.0" encoding="utf-8"?>
+<p:notes xmlns:a="http://schemas.openxmlformats.org/drawingml/2006/main" xmlns:r="http://schemas.openxmlformats.org/officeDocument/2006/relationships" xmlns:p="http://schemas.openxmlformats.org/presentationml/2006/main">
+  <p:cSld>
+    <p:spTree>
+      <p:nvGrpSpPr>
+        <p:cNvPr id="1" name=""/>
+        <p:cNvGrpSpPr/>
+        <p:nvPr/>
+      </p:nvGrpSpPr>
+      <p:grpSpPr>
+        <a:xfrm>
+          <a:off x="0" y="0"/>
+          <a:ext cx="0" cy="0"/>
+          <a:chOff x="0" y="0"/>
+          <a:chExt cx="0" cy="0"/>
+        </a:xfrm>
+      </p:grpSpPr>
+      <p:sp>
+        <p:nvSpPr>
+          <p:cNvPr id="2" name="Slide Image Placeholder 1"/>
+          <p:cNvSpPr>
+            <a:spLocks noGrp="1" noRot="1" noChangeAspect="1"/>
+          </p:cNvSpPr>
+          <p:nvPr>
+            <p:ph type="sldImg"/>
+          </p:nvPr>
+        </p:nvSpPr>
+        <p:spPr/>
+      </p:sp>
+      <p:sp>
+        <p:nvSpPr>
+          <p:cNvPr id="3" name="Notes Placeholder 2"/>
+          <p:cNvSpPr>
+            <a:spLocks noGrp="1"/>
+          </p:cNvSpPr>
+          <p:nvPr>
+            <p:ph type="body" idx="1"/>
+          </p:nvPr>
+        </p:nvSpPr>
+        <p:spPr/>
+        <p:txBody>
+          <a:bodyPr/>
+          <a:lstStyle/>
+          <a:p>
+            <a:r>
+              <a:rPr lang="en-US" dirty="0" smtClean="0"/>
+              <a:t>Important to note that those are two leading and trailing underscores</a:t>
+            </a:r>
+            <a:r>
+              <a:rPr lang="en-US" baseline="0" dirty="0" smtClean="0"/>
+              <a:t> </a:t>
+            </a:r>
+            <a:endParaRPr lang="en-US" dirty="0"/>
+          </a:p>
+        </p:txBody>
+      </p:sp>
+      <p:sp>
+        <p:nvSpPr>
+          <p:cNvPr id="4" name="Slide Number Placeholder 3"/>
+          <p:cNvSpPr>
+            <a:spLocks noGrp="1"/>
+          </p:cNvSpPr>
+          <p:nvPr>
+            <p:ph type="sldNum" sz="quarter" idx="10"/>
+          </p:nvPr>
+        </p:nvSpPr>
+        <p:spPr/>
+        <p:txBody>
+          <a:bodyPr/>
+          <a:lstStyle/>
+          <a:p>
+            <a:fld id="{BD0BF4AD-A0B8-A54B-BDEE-58CBE375DFB2}" type="slidenum">
+              <a:rPr lang="en-US" smtClean="0"/>
+              <a:t>6</a:t>
+            </a:fld>
+            <a:endParaRPr lang="en-US"/>
+          </a:p>
+        </p:txBody>
+      </p:sp>
+    </p:spTree>
+    <p:extLst>
+      <p:ext uri="{BB962C8B-B14F-4D97-AF65-F5344CB8AC3E}">
+        <p14:creationId xmlns:p14="http://schemas.microsoft.com/office/powerpoint/2010/main" val="1924729395"/>
+      </p:ext>
+    </p:extLst>
+  </p:cSld>
+  <p:clrMapOvr>
+    <a:masterClrMapping/>
+  </p:clrMapOvr>
+</p:notes>
+</file>
+
+<file path=ppt/notesSlides/notesSlide2.xml><?xml version="1.0" encoding="utf-8"?>
+<p:notes xmlns:a="http://schemas.openxmlformats.org/drawingml/2006/main" xmlns:r="http://schemas.openxmlformats.org/officeDocument/2006/relationships" xmlns:p="http://schemas.openxmlformats.org/presentationml/2006/main">
+  <p:cSld>
+    <p:spTree>
+      <p:nvGrpSpPr>
+        <p:cNvPr id="1" name=""/>
+        <p:cNvGrpSpPr/>
+        <p:nvPr/>
+      </p:nvGrpSpPr>
+      <p:grpSpPr>
+        <a:xfrm>
+          <a:off x="0" y="0"/>
+          <a:ext cx="0" cy="0"/>
+          <a:chOff x="0" y="0"/>
+          <a:chExt cx="0" cy="0"/>
+        </a:xfrm>
+      </p:grpSpPr>
+      <p:sp>
+        <p:nvSpPr>
+          <p:cNvPr id="2" name="Slide Image Placeholder 1"/>
+          <p:cNvSpPr>
+            <a:spLocks noGrp="1" noRot="1" noChangeAspect="1"/>
+          </p:cNvSpPr>
+          <p:nvPr>
+            <p:ph type="sldImg"/>
+          </p:nvPr>
+        </p:nvSpPr>
+        <p:spPr/>
+      </p:sp>
+      <p:sp>
+        <p:nvSpPr>
+          <p:cNvPr id="3" name="Notes Placeholder 2"/>
+          <p:cNvSpPr>
+            <a:spLocks noGrp="1"/>
+          </p:cNvSpPr>
+          <p:nvPr>
+            <p:ph type="body" idx="1"/>
+          </p:nvPr>
+        </p:nvSpPr>
+        <p:spPr/>
+        <p:txBody>
+          <a:bodyPr/>
+          <a:lstStyle/>
+          <a:p>
+            <a:r>
+              <a:rPr lang="en-US" dirty="0" smtClean="0"/>
+              <a:t>The</a:t>
+            </a:r>
+            <a:r>
+              <a:rPr lang="en-US" baseline="0" dirty="0" smtClean="0"/>
+              <a:t> extend function is like running multiple append functions at once (same as += with two lists) </a:t>
+            </a:r>
+            <a:endParaRPr lang="en-US" dirty="0"/>
+          </a:p>
+        </p:txBody>
+      </p:sp>
+      <p:sp>
+        <p:nvSpPr>
+          <p:cNvPr id="4" name="Slide Number Placeholder 3"/>
+          <p:cNvSpPr>
+            <a:spLocks noGrp="1"/>
+          </p:cNvSpPr>
+          <p:nvPr>
+            <p:ph type="sldNum" sz="quarter" idx="10"/>
+          </p:nvPr>
+        </p:nvSpPr>
+        <p:spPr/>
+        <p:txBody>
+          <a:bodyPr/>
+          <a:lstStyle/>
+          <a:p>
+            <a:fld id="{BD0BF4AD-A0B8-A54B-BDEE-58CBE375DFB2}" type="slidenum">
+              <a:rPr lang="en-US" smtClean="0"/>
+              <a:t>11</a:t>
+            </a:fld>
+            <a:endParaRPr lang="en-US"/>
+          </a:p>
+        </p:txBody>
+      </p:sp>
+    </p:spTree>
+    <p:extLst>
+      <p:ext uri="{BB962C8B-B14F-4D97-AF65-F5344CB8AC3E}">
+        <p14:creationId xmlns:p14="http://schemas.microsoft.com/office/powerpoint/2010/main" val="2058996954"/>
+      </p:ext>
+    </p:extLst>
+  </p:cSld>
+  <p:clrMapOvr>
+    <a:masterClrMapping/>
+  </p:clrMapOvr>
+</p:notes>
+</file>
+
 <file path=ppt/slideLayouts/slideLayout1.xml><?xml version="1.0" encoding="utf-8"?>
 <p:sldLayout xmlns:a="http://schemas.openxmlformats.org/drawingml/2006/main" xmlns:r="http://schemas.openxmlformats.org/officeDocument/2006/relationships" xmlns:p="http://schemas.openxmlformats.org/presentationml/2006/main" type="title" preserve="1">
   <p:cSld name="Title Slide">
@@ -757,7 +941,7 @@
           <a:p>
             <a:fld id="{51673806-0BCD-1F42-BAA8-2011034B3C6A}" type="datetimeFigureOut">
               <a:rPr lang="en-US" smtClean="0"/>
-              <a:t>5/12/20</a:t>
+              <a:t>5/15/20</a:t>
             </a:fld>
             <a:endParaRPr lang="en-US"/>
           </a:p>
@@ -1171,7 +1355,7 @@
           <a:p>
             <a:fld id="{51673806-0BCD-1F42-BAA8-2011034B3C6A}" type="datetimeFigureOut">
               <a:rPr lang="en-US" smtClean="0"/>
-              <a:t>5/12/20</a:t>
+              <a:t>5/15/20</a:t>
             </a:fld>
             <a:endParaRPr lang="en-US"/>
           </a:p>
@@ -1502,7 +1686,7 @@
           <a:p>
             <a:fld id="{51673806-0BCD-1F42-BAA8-2011034B3C6A}" type="datetimeFigureOut">
               <a:rPr lang="en-US" smtClean="0"/>
-              <a:t>5/12/20</a:t>
+              <a:t>5/15/20</a:t>
             </a:fld>
             <a:endParaRPr lang="en-US"/>
           </a:p>
@@ -1902,7 +2086,7 @@
           <a:p>
             <a:fld id="{51673806-0BCD-1F42-BAA8-2011034B3C6A}" type="datetimeFigureOut">
               <a:rPr lang="en-US" smtClean="0"/>
-              <a:t>5/12/20</a:t>
+              <a:t>5/15/20</a:t>
             </a:fld>
             <a:endParaRPr lang="en-US"/>
           </a:p>
@@ -2465,7 +2649,7 @@
           <a:p>
             <a:fld id="{51673806-0BCD-1F42-BAA8-2011034B3C6A}" type="datetimeFigureOut">
               <a:rPr lang="en-US" smtClean="0"/>
-              <a:t>5/12/20</a:t>
+              <a:t>5/15/20</a:t>
             </a:fld>
             <a:endParaRPr lang="en-US"/>
           </a:p>
@@ -3141,7 +3325,7 @@
           <a:p>
             <a:fld id="{51673806-0BCD-1F42-BAA8-2011034B3C6A}" type="datetimeFigureOut">
               <a:rPr lang="en-US" smtClean="0"/>
-              <a:t>5/12/20</a:t>
+              <a:t>5/15/20</a:t>
             </a:fld>
             <a:endParaRPr lang="en-US"/>
           </a:p>
@@ -4049,7 +4233,7 @@
           <a:p>
             <a:fld id="{51673806-0BCD-1F42-BAA8-2011034B3C6A}" type="datetimeFigureOut">
               <a:rPr lang="en-US" smtClean="0"/>
-              <a:t>5/12/20</a:t>
+              <a:t>5/15/20</a:t>
             </a:fld>
             <a:endParaRPr lang="en-US"/>
           </a:p>
@@ -4357,7 +4541,7 @@
           <a:p>
             <a:fld id="{51673806-0BCD-1F42-BAA8-2011034B3C6A}" type="datetimeFigureOut">
               <a:rPr lang="en-US" smtClean="0"/>
-              <a:t>5/12/20</a:t>
+              <a:t>5/15/20</a:t>
             </a:fld>
             <a:endParaRPr lang="en-US"/>
           </a:p>
@@ -4616,7 +4800,7 @@
           <a:p>
             <a:fld id="{51673806-0BCD-1F42-BAA8-2011034B3C6A}" type="datetimeFigureOut">
               <a:rPr lang="en-US" smtClean="0"/>
-              <a:t>5/12/20</a:t>
+              <a:t>5/15/20</a:t>
             </a:fld>
             <a:endParaRPr lang="en-US"/>
           </a:p>
@@ -4939,7 +5123,7 @@
           <a:p>
             <a:fld id="{51673806-0BCD-1F42-BAA8-2011034B3C6A}" type="datetimeFigureOut">
               <a:rPr lang="en-US" smtClean="0"/>
-              <a:t>5/12/20</a:t>
+              <a:t>5/15/20</a:t>
             </a:fld>
             <a:endParaRPr lang="en-US"/>
           </a:p>
@@ -5323,7 +5507,7 @@
           <a:p>
             <a:fld id="{51673806-0BCD-1F42-BAA8-2011034B3C6A}" type="datetimeFigureOut">
               <a:rPr lang="en-US" smtClean="0"/>
-              <a:t>5/12/20</a:t>
+              <a:t>5/15/20</a:t>
             </a:fld>
             <a:endParaRPr lang="en-US"/>
           </a:p>
@@ -5699,7 +5883,7 @@
           <a:p>
             <a:fld id="{51673806-0BCD-1F42-BAA8-2011034B3C6A}" type="datetimeFigureOut">
               <a:rPr lang="en-US" smtClean="0"/>
-              <a:t>5/12/20</a:t>
+              <a:t>5/15/20</a:t>
             </a:fld>
             <a:endParaRPr lang="en-US"/>
           </a:p>
@@ -6205,7 +6389,7 @@
           <a:p>
             <a:fld id="{51673806-0BCD-1F42-BAA8-2011034B3C6A}" type="datetimeFigureOut">
               <a:rPr lang="en-US" smtClean="0"/>
-              <a:t>5/12/20</a:t>
+              <a:t>5/15/20</a:t>
             </a:fld>
             <a:endParaRPr lang="en-US"/>
           </a:p>
@@ -6462,7 +6646,7 @@
           <a:p>
             <a:fld id="{51673806-0BCD-1F42-BAA8-2011034B3C6A}" type="datetimeFigureOut">
               <a:rPr lang="en-US" smtClean="0"/>
-              <a:t>5/12/20</a:t>
+              <a:t>5/15/20</a:t>
             </a:fld>
             <a:endParaRPr lang="en-US"/>
           </a:p>
@@ -6620,7 +6804,7 @@
           <a:p>
             <a:fld id="{51673806-0BCD-1F42-BAA8-2011034B3C6A}" type="datetimeFigureOut">
               <a:rPr lang="en-US" smtClean="0"/>
-              <a:t>5/12/20</a:t>
+              <a:t>5/15/20</a:t>
             </a:fld>
             <a:endParaRPr lang="en-US"/>
           </a:p>
@@ -7010,7 +7194,7 @@
           <a:p>
             <a:fld id="{51673806-0BCD-1F42-BAA8-2011034B3C6A}" type="datetimeFigureOut">
               <a:rPr lang="en-US" smtClean="0"/>
-              <a:t>5/12/20</a:t>
+              <a:t>5/15/20</a:t>
             </a:fld>
             <a:endParaRPr lang="en-US"/>
           </a:p>
@@ -7419,7 +7603,7 @@
           <a:p>
             <a:fld id="{51673806-0BCD-1F42-BAA8-2011034B3C6A}" type="datetimeFigureOut">
               <a:rPr lang="en-US" smtClean="0"/>
-              <a:t>5/12/20</a:t>
+              <a:t>5/15/20</a:t>
             </a:fld>
             <a:endParaRPr lang="en-US"/>
           </a:p>
@@ -7667,7 +7851,7 @@
             <a:fld id="{51673806-0BCD-1F42-BAA8-2011034B3C6A}" type="datetimeFigureOut">
               <a:rPr lang="en-US" smtClean="0"/>
               <a:pPr/>
-              <a:t>5/12/20</a:t>
+              <a:t>5/15/20</a:t>
             </a:fld>
             <a:endParaRPr lang="en-US" dirty="0"/>
           </a:p>
@@ -8864,36 +9048,6 @@
           <p:nvPr/>
         </p:nvPicPr>
         <p:blipFill>
-          <a:blip r:embed="rId2">
-            <a:extLst>
-              <a:ext uri="{28A0092B-C50C-407E-A947-70E740481C1C}">
-                <a14:useLocalDpi xmlns:a14="http://schemas.microsoft.com/office/drawing/2010/main" val="0"/>
-              </a:ext>
-            </a:extLst>
-          </a:blip>
-          <a:stretch>
-            <a:fillRect/>
-          </a:stretch>
-        </p:blipFill>
-        <p:spPr>
-          <a:xfrm>
-            <a:off x="3479800" y="2336873"/>
-            <a:ext cx="3200400" cy="876300"/>
-          </a:xfrm>
-          <a:prstGeom prst="rect">
-            <a:avLst/>
-          </a:prstGeom>
-        </p:spPr>
-      </p:pic>
-      <p:pic>
-        <p:nvPicPr>
-          <p:cNvPr id="6" name="Picture 5"/>
-          <p:cNvPicPr>
-            <a:picLocks noChangeAspect="1"/>
-          </p:cNvPicPr>
-          <p:nvPr/>
-        </p:nvPicPr>
-        <p:blipFill>
           <a:blip r:embed="rId3">
             <a:extLst>
               <a:ext uri="{28A0092B-C50C-407E-A947-70E740481C1C}">
@@ -8907,6 +9061,36 @@
         </p:blipFill>
         <p:spPr>
           <a:xfrm>
+            <a:off x="3479800" y="2336873"/>
+            <a:ext cx="3200400" cy="876300"/>
+          </a:xfrm>
+          <a:prstGeom prst="rect">
+            <a:avLst/>
+          </a:prstGeom>
+        </p:spPr>
+      </p:pic>
+      <p:pic>
+        <p:nvPicPr>
+          <p:cNvPr id="6" name="Picture 5"/>
+          <p:cNvPicPr>
+            <a:picLocks noChangeAspect="1"/>
+          </p:cNvPicPr>
+          <p:nvPr/>
+        </p:nvPicPr>
+        <p:blipFill>
+          <a:blip r:embed="rId4">
+            <a:extLst>
+              <a:ext uri="{28A0092B-C50C-407E-A947-70E740481C1C}">
+                <a14:useLocalDpi xmlns:a14="http://schemas.microsoft.com/office/drawing/2010/main" val="0"/>
+              </a:ext>
+            </a:extLst>
+          </a:blip>
+          <a:stretch>
+            <a:fillRect/>
+          </a:stretch>
+        </p:blipFill>
+        <p:spPr>
+          <a:xfrm>
             <a:off x="4347633" y="3715880"/>
             <a:ext cx="6667500" cy="990600"/>
           </a:xfrm>
@@ -8924,7 +9108,7 @@
           <p:nvPr/>
         </p:nvPicPr>
         <p:blipFill>
-          <a:blip r:embed="rId4">
+          <a:blip r:embed="rId5">
             <a:extLst>
               <a:ext uri="{28A0092B-C50C-407E-A947-70E740481C1C}">
                 <a14:useLocalDpi xmlns:a14="http://schemas.microsoft.com/office/drawing/2010/main" val="0"/>
@@ -9184,7 +9368,12 @@
             <p:ph idx="1"/>
           </p:nvPr>
         </p:nvSpPr>
-        <p:spPr/>
+        <p:spPr>
+          <a:xfrm>
+            <a:off x="680321" y="2336873"/>
+            <a:ext cx="9613861" cy="4227700"/>
+          </a:xfrm>
+        </p:spPr>
         <p:txBody>
           <a:bodyPr/>
           <a:lstStyle/>
@@ -9325,6 +9514,151 @@
               <a:rPr lang="en-US" dirty="0" smtClean="0"/>
               <a:t>: </a:t>
             </a:r>
+            <a:endParaRPr lang="en-US" dirty="0" smtClean="0"/>
+          </a:p>
+          <a:p>
+            <a:pPr marL="0" marR="0" lvl="0" indent="0" defTabSz="914400" eaLnBrk="1" fontAlgn="auto" latinLnBrk="0" hangingPunct="1">
+              <a:lnSpc>
+                <a:spcPct val="100000"/>
+              </a:lnSpc>
+              <a:spcBef>
+                <a:spcPts val="0"/>
+              </a:spcBef>
+              <a:spcAft>
+                <a:spcPts val="0"/>
+              </a:spcAft>
+              <a:buClrTx/>
+              <a:buSzTx/>
+              <a:buFontTx/>
+              <a:buNone/>
+              <a:tabLst/>
+              <a:defRPr/>
+            </a:pPr>
+            <a:endParaRPr lang="en-US" dirty="0"/>
+          </a:p>
+          <a:p>
+            <a:pPr marL="0" marR="0" lvl="0" indent="0" defTabSz="914400" eaLnBrk="1" fontAlgn="auto" latinLnBrk="0" hangingPunct="1">
+              <a:lnSpc>
+                <a:spcPct val="100000"/>
+              </a:lnSpc>
+              <a:spcBef>
+                <a:spcPts val="0"/>
+              </a:spcBef>
+              <a:spcAft>
+                <a:spcPts val="0"/>
+              </a:spcAft>
+              <a:buClrTx/>
+              <a:buSzTx/>
+              <a:buFontTx/>
+              <a:buNone/>
+              <a:tabLst/>
+              <a:defRPr/>
+            </a:pPr>
+            <a:endParaRPr lang="en-US" dirty="0" smtClean="0"/>
+          </a:p>
+          <a:p>
+            <a:pPr marL="0" marR="0" lvl="0" indent="0" defTabSz="914400" eaLnBrk="1" fontAlgn="auto" latinLnBrk="0" hangingPunct="1">
+              <a:lnSpc>
+                <a:spcPct val="100000"/>
+              </a:lnSpc>
+              <a:spcBef>
+                <a:spcPts val="0"/>
+              </a:spcBef>
+              <a:spcAft>
+                <a:spcPts val="0"/>
+              </a:spcAft>
+              <a:buClrTx/>
+              <a:buSzTx/>
+              <a:buFontTx/>
+              <a:buNone/>
+              <a:tabLst/>
+              <a:defRPr/>
+            </a:pPr>
+            <a:endParaRPr lang="en-US" dirty="0"/>
+          </a:p>
+          <a:p>
+            <a:pPr marL="0" marR="0" lvl="0" indent="0" defTabSz="914400" eaLnBrk="1" fontAlgn="auto" latinLnBrk="0" hangingPunct="1">
+              <a:lnSpc>
+                <a:spcPct val="100000"/>
+              </a:lnSpc>
+              <a:spcBef>
+                <a:spcPts val="0"/>
+              </a:spcBef>
+              <a:spcAft>
+                <a:spcPts val="0"/>
+              </a:spcAft>
+              <a:buClrTx/>
+              <a:buSzTx/>
+              <a:buFontTx/>
+              <a:buNone/>
+              <a:tabLst/>
+              <a:defRPr/>
+            </a:pPr>
+            <a:endParaRPr lang="en-US" dirty="0" smtClean="0"/>
+          </a:p>
+          <a:p>
+            <a:pPr marL="0" marR="0" lvl="0" indent="0" defTabSz="914400" eaLnBrk="1" fontAlgn="auto" latinLnBrk="0" hangingPunct="1">
+              <a:lnSpc>
+                <a:spcPct val="100000"/>
+              </a:lnSpc>
+              <a:spcBef>
+                <a:spcPts val="0"/>
+              </a:spcBef>
+              <a:spcAft>
+                <a:spcPts val="0"/>
+              </a:spcAft>
+              <a:buClrTx/>
+              <a:buSzTx/>
+              <a:buFontTx/>
+              <a:buNone/>
+              <a:tabLst/>
+              <a:defRPr/>
+            </a:pPr>
+            <a:endParaRPr lang="en-US" dirty="0" smtClean="0"/>
+          </a:p>
+          <a:p>
+            <a:pPr marL="0" marR="0" lvl="0" indent="0" defTabSz="914400" eaLnBrk="1" fontAlgn="auto" latinLnBrk="0" hangingPunct="1">
+              <a:lnSpc>
+                <a:spcPct val="100000"/>
+              </a:lnSpc>
+              <a:spcBef>
+                <a:spcPts val="0"/>
+              </a:spcBef>
+              <a:spcAft>
+                <a:spcPts val="0"/>
+              </a:spcAft>
+              <a:buClrTx/>
+              <a:buSzTx/>
+              <a:buFontTx/>
+              <a:buNone/>
+              <a:tabLst/>
+              <a:defRPr/>
+            </a:pPr>
+            <a:r>
+              <a:rPr lang="en-US" dirty="0" smtClean="0"/>
+              <a:t>Important: You </a:t>
+            </a:r>
+            <a:r>
+              <a:rPr lang="en-US" i="1" dirty="0" smtClean="0"/>
+              <a:t>cannot </a:t>
+            </a:r>
+            <a:r>
+              <a:rPr lang="en-US" dirty="0" smtClean="0"/>
+              <a:t>relative import in a </a:t>
+            </a:r>
+            <a:r>
+              <a:rPr lang="en-US" i="1" dirty="0" smtClean="0"/>
+              <a:t>__main__.</a:t>
+            </a:r>
+            <a:r>
+              <a:rPr lang="en-US" i="1" dirty="0" err="1" smtClean="0"/>
+              <a:t>py</a:t>
+            </a:r>
+            <a:r>
+              <a:rPr lang="en-US" dirty="0" smtClean="0"/>
+              <a:t> file </a:t>
+            </a:r>
+            <a:endParaRPr lang="en-US" dirty="0" smtClean="0"/>
           </a:p>
           <a:p>
             <a:pPr marL="0" marR="0" lvl="0" indent="0" defTabSz="914400" eaLnBrk="1" fontAlgn="auto" latinLnBrk="0" hangingPunct="1">
@@ -9460,7 +9794,7 @@
         </p:blipFill>
         <p:spPr>
           <a:xfrm>
-            <a:off x="3010751" y="5682189"/>
+            <a:off x="3010751" y="5013888"/>
             <a:ext cx="4953000" cy="508000"/>
           </a:xfrm>
           <a:prstGeom prst="rect">
@@ -9646,7 +9980,15 @@
             </a:pPr>
             <a:r>
               <a:rPr lang="en-US" dirty="0" smtClean="0"/>
-              <a:t>You never have to write that code again! Take a wild guess how a software engineer would describe repeatedly writing similar code </a:t>
+              <a:t>You never have to write that code again! Take a </a:t>
+            </a:r>
+            <a:r>
+              <a:rPr lang="en-US" dirty="0" smtClean="0"/>
+              <a:t>guess </a:t>
+            </a:r>
+            <a:r>
+              <a:rPr lang="en-US" dirty="0" smtClean="0"/>
+              <a:t>how a software engineer would describe repeatedly writing similar code </a:t>
             </a:r>
             <a:endParaRPr lang="en-US" dirty="0"/>
           </a:p>
@@ -9823,7 +10165,15 @@
             </a:pPr>
             <a:r>
               <a:rPr lang="en-US" dirty="0"/>
-              <a:t>You never have to write that code again! Take a wild guess how a software engineer would describe repeatedly writing similar </a:t>
+              <a:t>You never have to write that code again! Take a </a:t>
+            </a:r>
+            <a:r>
+              <a:rPr lang="en-US" dirty="0" smtClean="0"/>
+              <a:t>guess </a:t>
+            </a:r>
+            <a:r>
+              <a:rPr lang="en-US" dirty="0"/>
+              <a:t>how a software engineer would describe repeatedly writing similar </a:t>
             </a:r>
             <a:r>
               <a:rPr lang="en-US" dirty="0" smtClean="0"/>

</xml_diff>

<commit_message>
slides, exercises: minor edits prior to session 3
</commit_message>
<xml_diff>
--- a/slides/imports.pptx
+++ b/slides/imports.pptx
@@ -211,7 +211,7 @@
           <a:p>
             <a:fld id="{4AFF1A39-08FC-A241-8B97-468F53292083}" type="datetimeFigureOut">
               <a:rPr lang="en-US" smtClean="0"/>
-              <a:t>5/7/21</a:t>
+              <a:t>5/14/21</a:t>
             </a:fld>
             <a:endParaRPr lang="en-US"/>
           </a:p>
@@ -275,38 +275,37 @@
           <a:p>
             <a:pPr lvl="0"/>
             <a:r>
-              <a:rPr lang="en-US" smtClean="0"/>
+              <a:rPr lang="en-US"/>
               <a:t>Click to edit Master text styles</a:t>
             </a:r>
           </a:p>
           <a:p>
             <a:pPr lvl="1"/>
             <a:r>
-              <a:rPr lang="en-US" smtClean="0"/>
+              <a:rPr lang="en-US"/>
               <a:t>Second level</a:t>
             </a:r>
           </a:p>
           <a:p>
             <a:pPr lvl="2"/>
             <a:r>
-              <a:rPr lang="en-US" smtClean="0"/>
+              <a:rPr lang="en-US"/>
               <a:t>Third level</a:t>
             </a:r>
           </a:p>
           <a:p>
             <a:pPr lvl="3"/>
             <a:r>
-              <a:rPr lang="en-US" smtClean="0"/>
+              <a:rPr lang="en-US"/>
               <a:t>Fourth level</a:t>
             </a:r>
           </a:p>
           <a:p>
             <a:pPr lvl="4"/>
             <a:r>
-              <a:rPr lang="en-US" smtClean="0"/>
+              <a:rPr lang="en-US"/>
               <a:t>Fifth level</a:t>
             </a:r>
-            <a:endParaRPr lang="en-US"/>
           </a:p>
         </p:txBody>
       </p:sp>
@@ -524,14 +523,17 @@
           <a:lstStyle/>
           <a:p>
             <a:r>
-              <a:rPr lang="en-US" dirty="0" smtClean="0"/>
-              <a:t>Important to note that those are two leading and trailing underscores</a:t>
-            </a:r>
-            <a:r>
-              <a:rPr lang="en-US" baseline="0" dirty="0" smtClean="0"/>
+              <a:rPr lang="en-US" dirty="0"/>
+              <a:t>This is in the git repository under examples/</a:t>
+            </a:r>
+            <a:r>
+              <a:rPr lang="en-US" dirty="0" err="1"/>
+              <a:t>simple_import.py</a:t>
+            </a:r>
+            <a:r>
+              <a:rPr lang="en-US" dirty="0"/>
               <a:t> </a:t>
             </a:r>
-            <a:endParaRPr lang="en-US" dirty="0"/>
           </a:p>
         </p:txBody>
       </p:sp>
@@ -542,7 +544,7 @@
             <a:spLocks noGrp="1"/>
           </p:cNvSpPr>
           <p:nvPr>
-            <p:ph type="sldNum" sz="quarter" idx="10"/>
+            <p:ph type="sldNum" sz="quarter" idx="5"/>
           </p:nvPr>
         </p:nvSpPr>
         <p:spPr/>
@@ -552,7 +554,7 @@
           <a:p>
             <a:fld id="{BD0BF4AD-A0B8-A54B-BDEE-58CBE375DFB2}" type="slidenum">
               <a:rPr lang="en-US" smtClean="0"/>
-              <a:t>6</a:t>
+              <a:t>2</a:t>
             </a:fld>
             <a:endParaRPr lang="en-US"/>
           </a:p>
@@ -561,7 +563,7 @@
     </p:spTree>
     <p:extLst>
       <p:ext uri="{BB962C8B-B14F-4D97-AF65-F5344CB8AC3E}">
-        <p14:creationId xmlns:p14="http://schemas.microsoft.com/office/powerpoint/2010/main" val="1924729395"/>
+        <p14:creationId xmlns:p14="http://schemas.microsoft.com/office/powerpoint/2010/main" val="1110299883"/>
       </p:ext>
     </p:extLst>
   </p:cSld>
@@ -616,11 +618,309 @@
           <a:lstStyle/>
           <a:p>
             <a:r>
-              <a:rPr lang="en-US" dirty="0" smtClean="0"/>
+              <a:rPr lang="en-US" dirty="0"/>
+              <a:t>Important to note that those are two leading and trailing underscores</a:t>
+            </a:r>
+            <a:r>
+              <a:rPr lang="en-US" baseline="0" dirty="0"/>
+              <a:t> </a:t>
+            </a:r>
+            <a:endParaRPr lang="en-US" dirty="0"/>
+          </a:p>
+        </p:txBody>
+      </p:sp>
+      <p:sp>
+        <p:nvSpPr>
+          <p:cNvPr id="4" name="Slide Number Placeholder 3"/>
+          <p:cNvSpPr>
+            <a:spLocks noGrp="1"/>
+          </p:cNvSpPr>
+          <p:nvPr>
+            <p:ph type="sldNum" sz="quarter" idx="10"/>
+          </p:nvPr>
+        </p:nvSpPr>
+        <p:spPr/>
+        <p:txBody>
+          <a:bodyPr/>
+          <a:lstStyle/>
+          <a:p>
+            <a:fld id="{BD0BF4AD-A0B8-A54B-BDEE-58CBE375DFB2}" type="slidenum">
+              <a:rPr lang="en-US" smtClean="0"/>
+              <a:t>6</a:t>
+            </a:fld>
+            <a:endParaRPr lang="en-US"/>
+          </a:p>
+        </p:txBody>
+      </p:sp>
+    </p:spTree>
+    <p:extLst>
+      <p:ext uri="{BB962C8B-B14F-4D97-AF65-F5344CB8AC3E}">
+        <p14:creationId xmlns:p14="http://schemas.microsoft.com/office/powerpoint/2010/main" val="1924729395"/>
+      </p:ext>
+    </p:extLst>
+  </p:cSld>
+  <p:clrMapOvr>
+    <a:masterClrMapping/>
+  </p:clrMapOvr>
+</p:notes>
+</file>
+
+<file path=ppt/notesSlides/notesSlide3.xml><?xml version="1.0" encoding="utf-8"?>
+<p:notes xmlns:a="http://schemas.openxmlformats.org/drawingml/2006/main" xmlns:r="http://schemas.openxmlformats.org/officeDocument/2006/relationships" xmlns:p="http://schemas.openxmlformats.org/presentationml/2006/main">
+  <p:cSld>
+    <p:spTree>
+      <p:nvGrpSpPr>
+        <p:cNvPr id="1" name=""/>
+        <p:cNvGrpSpPr/>
+        <p:nvPr/>
+      </p:nvGrpSpPr>
+      <p:grpSpPr>
+        <a:xfrm>
+          <a:off x="0" y="0"/>
+          <a:ext cx="0" cy="0"/>
+          <a:chOff x="0" y="0"/>
+          <a:chExt cx="0" cy="0"/>
+        </a:xfrm>
+      </p:grpSpPr>
+      <p:sp>
+        <p:nvSpPr>
+          <p:cNvPr id="2" name="Slide Image Placeholder 1"/>
+          <p:cNvSpPr>
+            <a:spLocks noGrp="1" noRot="1" noChangeAspect="1"/>
+          </p:cNvSpPr>
+          <p:nvPr>
+            <p:ph type="sldImg"/>
+          </p:nvPr>
+        </p:nvSpPr>
+        <p:spPr/>
+      </p:sp>
+      <p:sp>
+        <p:nvSpPr>
+          <p:cNvPr id="3" name="Notes Placeholder 2"/>
+          <p:cNvSpPr>
+            <a:spLocks noGrp="1"/>
+          </p:cNvSpPr>
+          <p:nvPr>
+            <p:ph type="body" idx="1"/>
+          </p:nvPr>
+        </p:nvSpPr>
+        <p:spPr/>
+        <p:txBody>
+          <a:bodyPr/>
+          <a:lstStyle/>
+          <a:p>
+            <a:r>
+              <a:rPr lang="en-US" dirty="0"/>
+              <a:t>You should add an __</a:t>
+            </a:r>
+            <a:r>
+              <a:rPr lang="en-US" dirty="0" err="1"/>
+              <a:t>init</a:t>
+            </a:r>
+            <a:r>
+              <a:rPr lang="en-US" dirty="0"/>
+              <a:t>__.</a:t>
+            </a:r>
+            <a:r>
+              <a:rPr lang="en-US" dirty="0" err="1"/>
+              <a:t>py</a:t>
+            </a:r>
+            <a:r>
+              <a:rPr lang="en-US" dirty="0"/>
+              <a:t> file even if it’s blank to any directory that should be included in the installation/distribution process. Many algorithms for finding the sub-directories containing relevant code are based on the presence of an __</a:t>
+            </a:r>
+            <a:r>
+              <a:rPr lang="en-US" dirty="0" err="1"/>
+              <a:t>init</a:t>
+            </a:r>
+            <a:r>
+              <a:rPr lang="en-US" dirty="0"/>
+              <a:t>__.</a:t>
+            </a:r>
+            <a:r>
+              <a:rPr lang="en-US" dirty="0" err="1"/>
+              <a:t>py</a:t>
+            </a:r>
+            <a:r>
+              <a:rPr lang="en-US" dirty="0"/>
+              <a:t> file; even if one of these isn’t being used, it’s a useful indication that the given directory is a part of the package. </a:t>
+            </a:r>
+          </a:p>
+        </p:txBody>
+      </p:sp>
+      <p:sp>
+        <p:nvSpPr>
+          <p:cNvPr id="4" name="Slide Number Placeholder 3"/>
+          <p:cNvSpPr>
+            <a:spLocks noGrp="1"/>
+          </p:cNvSpPr>
+          <p:nvPr>
+            <p:ph type="sldNum" sz="quarter" idx="5"/>
+          </p:nvPr>
+        </p:nvSpPr>
+        <p:spPr/>
+        <p:txBody>
+          <a:bodyPr/>
+          <a:lstStyle/>
+          <a:p>
+            <a:fld id="{BD0BF4AD-A0B8-A54B-BDEE-58CBE375DFB2}" type="slidenum">
+              <a:rPr lang="en-US" smtClean="0"/>
+              <a:t>8</a:t>
+            </a:fld>
+            <a:endParaRPr lang="en-US"/>
+          </a:p>
+        </p:txBody>
+      </p:sp>
+    </p:spTree>
+    <p:extLst>
+      <p:ext uri="{BB962C8B-B14F-4D97-AF65-F5344CB8AC3E}">
+        <p14:creationId xmlns:p14="http://schemas.microsoft.com/office/powerpoint/2010/main" val="3694391802"/>
+      </p:ext>
+    </p:extLst>
+  </p:cSld>
+  <p:clrMapOvr>
+    <a:masterClrMapping/>
+  </p:clrMapOvr>
+</p:notes>
+</file>
+
+<file path=ppt/notesSlides/notesSlide4.xml><?xml version="1.0" encoding="utf-8"?>
+<p:notes xmlns:a="http://schemas.openxmlformats.org/drawingml/2006/main" xmlns:r="http://schemas.openxmlformats.org/officeDocument/2006/relationships" xmlns:p="http://schemas.openxmlformats.org/presentationml/2006/main">
+  <p:cSld>
+    <p:spTree>
+      <p:nvGrpSpPr>
+        <p:cNvPr id="1" name=""/>
+        <p:cNvGrpSpPr/>
+        <p:nvPr/>
+      </p:nvGrpSpPr>
+      <p:grpSpPr>
+        <a:xfrm>
+          <a:off x="0" y="0"/>
+          <a:ext cx="0" cy="0"/>
+          <a:chOff x="0" y="0"/>
+          <a:chExt cx="0" cy="0"/>
+        </a:xfrm>
+      </p:grpSpPr>
+      <p:sp>
+        <p:nvSpPr>
+          <p:cNvPr id="2" name="Slide Image Placeholder 1"/>
+          <p:cNvSpPr>
+            <a:spLocks noGrp="1" noRot="1" noChangeAspect="1"/>
+          </p:cNvSpPr>
+          <p:nvPr>
+            <p:ph type="sldImg"/>
+          </p:nvPr>
+        </p:nvSpPr>
+        <p:spPr/>
+      </p:sp>
+      <p:sp>
+        <p:nvSpPr>
+          <p:cNvPr id="3" name="Notes Placeholder 2"/>
+          <p:cNvSpPr>
+            <a:spLocks noGrp="1"/>
+          </p:cNvSpPr>
+          <p:nvPr>
+            <p:ph type="body" idx="1"/>
+          </p:nvPr>
+        </p:nvSpPr>
+        <p:spPr/>
+        <p:txBody>
+          <a:bodyPr/>
+          <a:lstStyle/>
+          <a:p>
+            <a:r>
+              <a:rPr lang="en-US" dirty="0"/>
+              <a:t>If you try to use relative imports outside of a python package, it’ll raise an error. </a:t>
+            </a:r>
+          </a:p>
+        </p:txBody>
+      </p:sp>
+      <p:sp>
+        <p:nvSpPr>
+          <p:cNvPr id="4" name="Slide Number Placeholder 3"/>
+          <p:cNvSpPr>
+            <a:spLocks noGrp="1"/>
+          </p:cNvSpPr>
+          <p:nvPr>
+            <p:ph type="sldNum" sz="quarter" idx="5"/>
+          </p:nvPr>
+        </p:nvSpPr>
+        <p:spPr/>
+        <p:txBody>
+          <a:bodyPr/>
+          <a:lstStyle/>
+          <a:p>
+            <a:fld id="{BD0BF4AD-A0B8-A54B-BDEE-58CBE375DFB2}" type="slidenum">
+              <a:rPr lang="en-US" smtClean="0"/>
+              <a:t>9</a:t>
+            </a:fld>
+            <a:endParaRPr lang="en-US"/>
+          </a:p>
+        </p:txBody>
+      </p:sp>
+    </p:spTree>
+    <p:extLst>
+      <p:ext uri="{BB962C8B-B14F-4D97-AF65-F5344CB8AC3E}">
+        <p14:creationId xmlns:p14="http://schemas.microsoft.com/office/powerpoint/2010/main" val="1808631234"/>
+      </p:ext>
+    </p:extLst>
+  </p:cSld>
+  <p:clrMapOvr>
+    <a:masterClrMapping/>
+  </p:clrMapOvr>
+</p:notes>
+</file>
+
+<file path=ppt/notesSlides/notesSlide5.xml><?xml version="1.0" encoding="utf-8"?>
+<p:notes xmlns:a="http://schemas.openxmlformats.org/drawingml/2006/main" xmlns:r="http://schemas.openxmlformats.org/officeDocument/2006/relationships" xmlns:p="http://schemas.openxmlformats.org/presentationml/2006/main">
+  <p:cSld>
+    <p:spTree>
+      <p:nvGrpSpPr>
+        <p:cNvPr id="1" name=""/>
+        <p:cNvGrpSpPr/>
+        <p:nvPr/>
+      </p:nvGrpSpPr>
+      <p:grpSpPr>
+        <a:xfrm>
+          <a:off x="0" y="0"/>
+          <a:ext cx="0" cy="0"/>
+          <a:chOff x="0" y="0"/>
+          <a:chExt cx="0" cy="0"/>
+        </a:xfrm>
+      </p:grpSpPr>
+      <p:sp>
+        <p:nvSpPr>
+          <p:cNvPr id="2" name="Slide Image Placeholder 1"/>
+          <p:cNvSpPr>
+            <a:spLocks noGrp="1" noRot="1" noChangeAspect="1"/>
+          </p:cNvSpPr>
+          <p:nvPr>
+            <p:ph type="sldImg"/>
+          </p:nvPr>
+        </p:nvSpPr>
+        <p:spPr/>
+      </p:sp>
+      <p:sp>
+        <p:nvSpPr>
+          <p:cNvPr id="3" name="Notes Placeholder 2"/>
+          <p:cNvSpPr>
+            <a:spLocks noGrp="1"/>
+          </p:cNvSpPr>
+          <p:nvPr>
+            <p:ph type="body" idx="1"/>
+          </p:nvPr>
+        </p:nvSpPr>
+        <p:spPr/>
+        <p:txBody>
+          <a:bodyPr/>
+          <a:lstStyle/>
+          <a:p>
+            <a:r>
+              <a:rPr lang="en-US" dirty="0"/>
               <a:t>The</a:t>
             </a:r>
             <a:r>
-              <a:rPr lang="en-US" baseline="0" dirty="0" smtClean="0"/>
+              <a:rPr lang="en-US" baseline="0" dirty="0"/>
               <a:t> extend function is like running multiple append functions at once (same as += with two lists) </a:t>
             </a:r>
             <a:endParaRPr lang="en-US" dirty="0"/>
@@ -850,10 +1150,9 @@
           </a:lstStyle>
           <a:p>
             <a:r>
-              <a:rPr lang="en-US" dirty="0" smtClean="0"/>
+              <a:rPr lang="en-US" dirty="0"/>
               <a:t>Click to edit Master title style</a:t>
             </a:r>
-            <a:endParaRPr lang="en-US" dirty="0"/>
           </a:p>
         </p:txBody>
       </p:sp>
@@ -917,10 +1216,9 @@
           </a:lstStyle>
           <a:p>
             <a:r>
-              <a:rPr lang="en-US" dirty="0" smtClean="0"/>
+              <a:rPr lang="en-US" dirty="0"/>
               <a:t>Click to edit Master subtitle style</a:t>
             </a:r>
-            <a:endParaRPr lang="en-US" dirty="0"/>
           </a:p>
         </p:txBody>
       </p:sp>
@@ -941,7 +1239,7 @@
           <a:p>
             <a:fld id="{51673806-0BCD-1F42-BAA8-2011034B3C6A}" type="datetimeFigureOut">
               <a:rPr lang="en-US" smtClean="0"/>
-              <a:t>5/7/21</a:t>
+              <a:t>5/14/21</a:t>
             </a:fld>
             <a:endParaRPr lang="en-US"/>
           </a:p>
@@ -1190,7 +1488,7 @@
           </a:lstStyle>
           <a:p>
             <a:r>
-              <a:rPr lang="en-US" smtClean="0"/>
+              <a:rPr lang="en-US"/>
               <a:t>Click to edit Master title style</a:t>
             </a:r>
             <a:endParaRPr lang="en-US" dirty="0"/>
@@ -1266,7 +1564,7 @@
           </a:lstStyle>
           <a:p>
             <a:r>
-              <a:rPr lang="en-US" smtClean="0"/>
+              <a:rPr lang="en-US"/>
               <a:t>Drag picture to placeholder or click icon to add</a:t>
             </a:r>
             <a:endParaRPr lang="en-US" dirty="0"/>
@@ -1332,7 +1630,7 @@
           <a:p>
             <a:pPr lvl="0"/>
             <a:r>
-              <a:rPr lang="en-US" smtClean="0"/>
+              <a:rPr lang="en-US"/>
               <a:t>Click to edit Master text styles</a:t>
             </a:r>
           </a:p>
@@ -1355,7 +1653,7 @@
           <a:p>
             <a:fld id="{51673806-0BCD-1F42-BAA8-2011034B3C6A}" type="datetimeFigureOut">
               <a:rPr lang="en-US" smtClean="0"/>
-              <a:t>5/7/21</a:t>
+              <a:t>5/14/21</a:t>
             </a:fld>
             <a:endParaRPr lang="en-US"/>
           </a:p>
@@ -1597,7 +1895,7 @@
           </a:lstStyle>
           <a:p>
             <a:r>
-              <a:rPr lang="en-US" smtClean="0"/>
+              <a:rPr lang="en-US"/>
               <a:t>Click to edit Master title style</a:t>
             </a:r>
             <a:endParaRPr lang="en-US" dirty="0"/>
@@ -1663,7 +1961,7 @@
           <a:p>
             <a:pPr lvl="0"/>
             <a:r>
-              <a:rPr lang="en-US" smtClean="0"/>
+              <a:rPr lang="en-US"/>
               <a:t>Click to edit Master text styles</a:t>
             </a:r>
           </a:p>
@@ -1686,7 +1984,7 @@
           <a:p>
             <a:fld id="{51673806-0BCD-1F42-BAA8-2011034B3C6A}" type="datetimeFigureOut">
               <a:rPr lang="en-US" smtClean="0"/>
-              <a:t>5/7/21</a:t>
+              <a:t>5/14/21</a:t>
             </a:fld>
             <a:endParaRPr lang="en-US"/>
           </a:p>
@@ -1928,7 +2226,7 @@
           </a:lstStyle>
           <a:p>
             <a:r>
-              <a:rPr lang="en-US" smtClean="0"/>
+              <a:rPr lang="en-US"/>
               <a:t>Click to edit Master title style</a:t>
             </a:r>
             <a:endParaRPr lang="en-US" dirty="0"/>
@@ -1996,7 +2294,7 @@
           <a:p>
             <a:pPr lvl="0"/>
             <a:r>
-              <a:rPr lang="en-US" smtClean="0"/>
+              <a:rPr lang="en-US"/>
               <a:t>Click to edit Master text styles</a:t>
             </a:r>
           </a:p>
@@ -2063,7 +2361,7 @@
           <a:p>
             <a:pPr lvl="0"/>
             <a:r>
-              <a:rPr lang="en-US" smtClean="0"/>
+              <a:rPr lang="en-US"/>
               <a:t>Click to edit Master text styles</a:t>
             </a:r>
           </a:p>
@@ -2086,7 +2384,7 @@
           <a:p>
             <a:fld id="{51673806-0BCD-1F42-BAA8-2011034B3C6A}" type="datetimeFigureOut">
               <a:rPr lang="en-US" smtClean="0"/>
-              <a:t>5/7/21</a:t>
+              <a:t>5/14/21</a:t>
             </a:fld>
             <a:endParaRPr lang="en-US"/>
           </a:p>
@@ -2560,7 +2858,7 @@
           </a:lstStyle>
           <a:p>
             <a:r>
-              <a:rPr lang="en-US" smtClean="0"/>
+              <a:rPr lang="en-US"/>
               <a:t>Click to edit Master title style</a:t>
             </a:r>
             <a:endParaRPr lang="en-US" dirty="0"/>
@@ -2626,7 +2924,7 @@
           <a:p>
             <a:pPr lvl="0"/>
             <a:r>
-              <a:rPr lang="en-US" smtClean="0"/>
+              <a:rPr lang="en-US"/>
               <a:t>Click to edit Master text styles</a:t>
             </a:r>
           </a:p>
@@ -2649,7 +2947,7 @@
           <a:p>
             <a:fld id="{51673806-0BCD-1F42-BAA8-2011034B3C6A}" type="datetimeFigureOut">
               <a:rPr lang="en-US" smtClean="0"/>
-              <a:t>5/7/21</a:t>
+              <a:t>5/14/21</a:t>
             </a:fld>
             <a:endParaRPr lang="en-US"/>
           </a:p>
@@ -2887,7 +3185,7 @@
           <a:lstStyle/>
           <a:p>
             <a:r>
-              <a:rPr lang="en-US" smtClean="0"/>
+              <a:rPr lang="en-US"/>
               <a:t>Click to edit Master title style</a:t>
             </a:r>
             <a:endParaRPr lang="en-US" dirty="0"/>
@@ -2959,7 +3257,7 @@
           <a:p>
             <a:pPr lvl="0"/>
             <a:r>
-              <a:rPr lang="en-US" smtClean="0"/>
+              <a:rPr lang="en-US"/>
               <a:t>Click to edit Master text styles</a:t>
             </a:r>
           </a:p>
@@ -3026,7 +3324,7 @@
           <a:p>
             <a:pPr lvl="0"/>
             <a:r>
-              <a:rPr lang="en-US" smtClean="0"/>
+              <a:rPr lang="en-US"/>
               <a:t>Click to edit Master text styles</a:t>
             </a:r>
           </a:p>
@@ -3097,7 +3395,7 @@
           <a:p>
             <a:pPr lvl="0"/>
             <a:r>
-              <a:rPr lang="en-US" smtClean="0"/>
+              <a:rPr lang="en-US"/>
               <a:t>Click to edit Master text styles</a:t>
             </a:r>
           </a:p>
@@ -3164,7 +3462,7 @@
           <a:p>
             <a:pPr lvl="0"/>
             <a:r>
-              <a:rPr lang="en-US" smtClean="0"/>
+              <a:rPr lang="en-US"/>
               <a:t>Click to edit Master text styles</a:t>
             </a:r>
           </a:p>
@@ -3235,7 +3533,7 @@
           <a:p>
             <a:pPr lvl="0"/>
             <a:r>
-              <a:rPr lang="en-US" smtClean="0"/>
+              <a:rPr lang="en-US"/>
               <a:t>Click to edit Master text styles</a:t>
             </a:r>
           </a:p>
@@ -3302,7 +3600,7 @@
           <a:p>
             <a:pPr lvl="0"/>
             <a:r>
-              <a:rPr lang="en-US" smtClean="0"/>
+              <a:rPr lang="en-US"/>
               <a:t>Click to edit Master text styles</a:t>
             </a:r>
           </a:p>
@@ -3325,7 +3623,7 @@
           <a:p>
             <a:fld id="{51673806-0BCD-1F42-BAA8-2011034B3C6A}" type="datetimeFigureOut">
               <a:rPr lang="en-US" smtClean="0"/>
-              <a:t>5/7/21</a:t>
+              <a:t>5/14/21</a:t>
             </a:fld>
             <a:endParaRPr lang="en-US"/>
           </a:p>
@@ -3558,7 +3856,7 @@
           <a:lstStyle/>
           <a:p>
             <a:r>
-              <a:rPr lang="en-US" smtClean="0"/>
+              <a:rPr lang="en-US"/>
               <a:t>Click to edit Master title style</a:t>
             </a:r>
             <a:endParaRPr lang="en-US" dirty="0"/>
@@ -3630,7 +3928,7 @@
           <a:p>
             <a:pPr lvl="0"/>
             <a:r>
-              <a:rPr lang="en-US" smtClean="0"/>
+              <a:rPr lang="en-US"/>
               <a:t>Click to edit Master text styles</a:t>
             </a:r>
           </a:p>
@@ -3708,7 +4006,7 @@
           </a:lstStyle>
           <a:p>
             <a:r>
-              <a:rPr lang="en-US" smtClean="0"/>
+              <a:rPr lang="en-US"/>
               <a:t>Drag picture to placeholder or click icon to add</a:t>
             </a:r>
             <a:endParaRPr lang="en-US" dirty="0"/>
@@ -3776,7 +4074,7 @@
           <a:p>
             <a:pPr lvl="0"/>
             <a:r>
-              <a:rPr lang="en-US" smtClean="0"/>
+              <a:rPr lang="en-US"/>
               <a:t>Click to edit Master text styles</a:t>
             </a:r>
           </a:p>
@@ -3847,7 +4145,7 @@
           <a:p>
             <a:pPr lvl="0"/>
             <a:r>
-              <a:rPr lang="en-US" smtClean="0"/>
+              <a:rPr lang="en-US"/>
               <a:t>Click to edit Master text styles</a:t>
             </a:r>
           </a:p>
@@ -3925,7 +4223,7 @@
           </a:lstStyle>
           <a:p>
             <a:r>
-              <a:rPr lang="en-US" smtClean="0"/>
+              <a:rPr lang="en-US"/>
               <a:t>Drag picture to placeholder or click icon to add</a:t>
             </a:r>
             <a:endParaRPr lang="en-US" dirty="0"/>
@@ -3993,7 +4291,7 @@
           <a:p>
             <a:pPr lvl="0"/>
             <a:r>
-              <a:rPr lang="en-US" smtClean="0"/>
+              <a:rPr lang="en-US"/>
               <a:t>Click to edit Master text styles</a:t>
             </a:r>
           </a:p>
@@ -4064,7 +4362,7 @@
           <a:p>
             <a:pPr lvl="0"/>
             <a:r>
-              <a:rPr lang="en-US" smtClean="0"/>
+              <a:rPr lang="en-US"/>
               <a:t>Click to edit Master text styles</a:t>
             </a:r>
           </a:p>
@@ -4142,7 +4440,7 @@
           </a:lstStyle>
           <a:p>
             <a:r>
-              <a:rPr lang="en-US" smtClean="0"/>
+              <a:rPr lang="en-US"/>
               <a:t>Drag picture to placeholder or click icon to add</a:t>
             </a:r>
             <a:endParaRPr lang="en-US" dirty="0"/>
@@ -4210,7 +4508,7 @@
           <a:p>
             <a:pPr lvl="0"/>
             <a:r>
-              <a:rPr lang="en-US" smtClean="0"/>
+              <a:rPr lang="en-US"/>
               <a:t>Click to edit Master text styles</a:t>
             </a:r>
           </a:p>
@@ -4233,7 +4531,7 @@
           <a:p>
             <a:fld id="{51673806-0BCD-1F42-BAA8-2011034B3C6A}" type="datetimeFigureOut">
               <a:rPr lang="en-US" smtClean="0"/>
-              <a:t>5/7/21</a:t>
+              <a:t>5/14/21</a:t>
             </a:fld>
             <a:endParaRPr lang="en-US"/>
           </a:p>
@@ -4465,7 +4763,7 @@
           </a:lstStyle>
           <a:p>
             <a:r>
-              <a:rPr lang="en-US" smtClean="0"/>
+              <a:rPr lang="en-US"/>
               <a:t>Click to edit Master title style</a:t>
             </a:r>
             <a:endParaRPr lang="en-US" dirty="0"/>
@@ -4489,35 +4787,35 @@
           <a:p>
             <a:pPr lvl="0"/>
             <a:r>
-              <a:rPr lang="en-US" smtClean="0"/>
+              <a:rPr lang="en-US"/>
               <a:t>Click to edit Master text styles</a:t>
             </a:r>
           </a:p>
           <a:p>
             <a:pPr lvl="1"/>
             <a:r>
-              <a:rPr lang="en-US" smtClean="0"/>
+              <a:rPr lang="en-US"/>
               <a:t>Second level</a:t>
             </a:r>
           </a:p>
           <a:p>
             <a:pPr lvl="2"/>
             <a:r>
-              <a:rPr lang="en-US" smtClean="0"/>
+              <a:rPr lang="en-US"/>
               <a:t>Third level</a:t>
             </a:r>
           </a:p>
           <a:p>
             <a:pPr lvl="3"/>
             <a:r>
-              <a:rPr lang="en-US" smtClean="0"/>
+              <a:rPr lang="en-US"/>
               <a:t>Fourth level</a:t>
             </a:r>
           </a:p>
           <a:p>
             <a:pPr lvl="4"/>
             <a:r>
-              <a:rPr lang="en-US" smtClean="0"/>
+              <a:rPr lang="en-US"/>
               <a:t>Fifth level</a:t>
             </a:r>
             <a:endParaRPr lang="en-US" dirty="0"/>
@@ -4541,7 +4839,7 @@
           <a:p>
             <a:fld id="{51673806-0BCD-1F42-BAA8-2011034B3C6A}" type="datetimeFigureOut">
               <a:rPr lang="en-US" smtClean="0"/>
-              <a:t>5/7/21</a:t>
+              <a:t>5/14/21</a:t>
             </a:fld>
             <a:endParaRPr lang="en-US"/>
           </a:p>
@@ -4714,7 +5012,7 @@
           <a:lstStyle/>
           <a:p>
             <a:r>
-              <a:rPr lang="en-US" smtClean="0"/>
+              <a:rPr lang="en-US"/>
               <a:t>Click to edit Master title style</a:t>
             </a:r>
             <a:endParaRPr lang="en-US" dirty="0"/>
@@ -4743,35 +5041,35 @@
           <a:p>
             <a:pPr lvl="0"/>
             <a:r>
-              <a:rPr lang="en-US" smtClean="0"/>
+              <a:rPr lang="en-US"/>
               <a:t>Click to edit Master text styles</a:t>
             </a:r>
           </a:p>
           <a:p>
             <a:pPr lvl="1"/>
             <a:r>
-              <a:rPr lang="en-US" smtClean="0"/>
+              <a:rPr lang="en-US"/>
               <a:t>Second level</a:t>
             </a:r>
           </a:p>
           <a:p>
             <a:pPr lvl="2"/>
             <a:r>
-              <a:rPr lang="en-US" smtClean="0"/>
+              <a:rPr lang="en-US"/>
               <a:t>Third level</a:t>
             </a:r>
           </a:p>
           <a:p>
             <a:pPr lvl="3"/>
             <a:r>
-              <a:rPr lang="en-US" smtClean="0"/>
+              <a:rPr lang="en-US"/>
               <a:t>Fourth level</a:t>
             </a:r>
           </a:p>
           <a:p>
             <a:pPr lvl="4"/>
             <a:r>
-              <a:rPr lang="en-US" smtClean="0"/>
+              <a:rPr lang="en-US"/>
               <a:t>Fifth level</a:t>
             </a:r>
             <a:endParaRPr lang="en-US" dirty="0"/>
@@ -4800,7 +5098,7 @@
           <a:p>
             <a:fld id="{51673806-0BCD-1F42-BAA8-2011034B3C6A}" type="datetimeFigureOut">
               <a:rPr lang="en-US" smtClean="0"/>
-              <a:t>5/7/21</a:t>
+              <a:t>5/14/21</a:t>
             </a:fld>
             <a:endParaRPr lang="en-US"/>
           </a:p>
@@ -5047,7 +5345,7 @@
           <a:lstStyle/>
           <a:p>
             <a:r>
-              <a:rPr lang="en-US" smtClean="0"/>
+              <a:rPr lang="en-US"/>
               <a:t>Click to edit Master title style</a:t>
             </a:r>
             <a:endParaRPr lang="en-US" dirty="0"/>
@@ -5071,35 +5369,35 @@
           <a:p>
             <a:pPr lvl="0"/>
             <a:r>
-              <a:rPr lang="en-US" smtClean="0"/>
+              <a:rPr lang="en-US"/>
               <a:t>Click to edit Master text styles</a:t>
             </a:r>
           </a:p>
           <a:p>
             <a:pPr lvl="1"/>
             <a:r>
-              <a:rPr lang="en-US" smtClean="0"/>
+              <a:rPr lang="en-US"/>
               <a:t>Second level</a:t>
             </a:r>
           </a:p>
           <a:p>
             <a:pPr lvl="2"/>
             <a:r>
-              <a:rPr lang="en-US" smtClean="0"/>
+              <a:rPr lang="en-US"/>
               <a:t>Third level</a:t>
             </a:r>
           </a:p>
           <a:p>
             <a:pPr lvl="3"/>
             <a:r>
-              <a:rPr lang="en-US" smtClean="0"/>
+              <a:rPr lang="en-US"/>
               <a:t>Fourth level</a:t>
             </a:r>
           </a:p>
           <a:p>
             <a:pPr lvl="4"/>
             <a:r>
-              <a:rPr lang="en-US" smtClean="0"/>
+              <a:rPr lang="en-US"/>
               <a:t>Fifth level</a:t>
             </a:r>
             <a:endParaRPr lang="en-US" dirty="0"/>
@@ -5123,7 +5421,7 @@
           <a:p>
             <a:fld id="{51673806-0BCD-1F42-BAA8-2011034B3C6A}" type="datetimeFigureOut">
               <a:rPr lang="en-US" smtClean="0"/>
-              <a:t>5/7/21</a:t>
+              <a:t>5/14/21</a:t>
             </a:fld>
             <a:endParaRPr lang="en-US"/>
           </a:p>
@@ -5362,7 +5660,7 @@
           </a:lstStyle>
           <a:p>
             <a:r>
-              <a:rPr lang="en-US" smtClean="0"/>
+              <a:rPr lang="en-US"/>
               <a:t>Click to edit Master title style</a:t>
             </a:r>
             <a:endParaRPr lang="en-US" dirty="0"/>
@@ -5484,7 +5782,7 @@
           <a:p>
             <a:pPr lvl="0"/>
             <a:r>
-              <a:rPr lang="en-US" smtClean="0"/>
+              <a:rPr lang="en-US"/>
               <a:t>Click to edit Master text styles</a:t>
             </a:r>
           </a:p>
@@ -5507,7 +5805,7 @@
           <a:p>
             <a:fld id="{51673806-0BCD-1F42-BAA8-2011034B3C6A}" type="datetimeFigureOut">
               <a:rPr lang="en-US" smtClean="0"/>
-              <a:t>5/7/21</a:t>
+              <a:t>5/14/21</a:t>
             </a:fld>
             <a:endParaRPr lang="en-US"/>
           </a:p>
@@ -5745,7 +6043,7 @@
           <a:lstStyle/>
           <a:p>
             <a:r>
-              <a:rPr lang="en-US" smtClean="0"/>
+              <a:rPr lang="en-US"/>
               <a:t>Click to edit Master title style</a:t>
             </a:r>
             <a:endParaRPr lang="en-US" dirty="0"/>
@@ -5774,35 +6072,35 @@
           <a:p>
             <a:pPr lvl="0"/>
             <a:r>
-              <a:rPr lang="en-US" smtClean="0"/>
+              <a:rPr lang="en-US"/>
               <a:t>Click to edit Master text styles</a:t>
             </a:r>
           </a:p>
           <a:p>
             <a:pPr lvl="1"/>
             <a:r>
-              <a:rPr lang="en-US" smtClean="0"/>
+              <a:rPr lang="en-US"/>
               <a:t>Second level</a:t>
             </a:r>
           </a:p>
           <a:p>
             <a:pPr lvl="2"/>
             <a:r>
-              <a:rPr lang="en-US" smtClean="0"/>
+              <a:rPr lang="en-US"/>
               <a:t>Third level</a:t>
             </a:r>
           </a:p>
           <a:p>
             <a:pPr lvl="3"/>
             <a:r>
-              <a:rPr lang="en-US" smtClean="0"/>
+              <a:rPr lang="en-US"/>
               <a:t>Fourth level</a:t>
             </a:r>
           </a:p>
           <a:p>
             <a:pPr lvl="4"/>
             <a:r>
-              <a:rPr lang="en-US" smtClean="0"/>
+              <a:rPr lang="en-US"/>
               <a:t>Fifth level</a:t>
             </a:r>
             <a:endParaRPr lang="en-US" dirty="0"/>
@@ -5831,35 +6129,35 @@
           <a:p>
             <a:pPr lvl="0"/>
             <a:r>
-              <a:rPr lang="en-US" smtClean="0"/>
+              <a:rPr lang="en-US"/>
               <a:t>Click to edit Master text styles</a:t>
             </a:r>
           </a:p>
           <a:p>
             <a:pPr lvl="1"/>
             <a:r>
-              <a:rPr lang="en-US" smtClean="0"/>
+              <a:rPr lang="en-US"/>
               <a:t>Second level</a:t>
             </a:r>
           </a:p>
           <a:p>
             <a:pPr lvl="2"/>
             <a:r>
-              <a:rPr lang="en-US" smtClean="0"/>
+              <a:rPr lang="en-US"/>
               <a:t>Third level</a:t>
             </a:r>
           </a:p>
           <a:p>
             <a:pPr lvl="3"/>
             <a:r>
-              <a:rPr lang="en-US" smtClean="0"/>
+              <a:rPr lang="en-US"/>
               <a:t>Fourth level</a:t>
             </a:r>
           </a:p>
           <a:p>
             <a:pPr lvl="4"/>
             <a:r>
-              <a:rPr lang="en-US" smtClean="0"/>
+              <a:rPr lang="en-US"/>
               <a:t>Fifth level</a:t>
             </a:r>
             <a:endParaRPr lang="en-US" dirty="0"/>
@@ -5883,7 +6181,7 @@
           <a:p>
             <a:fld id="{51673806-0BCD-1F42-BAA8-2011034B3C6A}" type="datetimeFigureOut">
               <a:rPr lang="en-US" smtClean="0"/>
-              <a:t>5/7/21</a:t>
+              <a:t>5/14/21</a:t>
             </a:fld>
             <a:endParaRPr lang="en-US"/>
           </a:p>
@@ -6121,7 +6419,7 @@
           <a:lstStyle/>
           <a:p>
             <a:r>
-              <a:rPr lang="en-US" smtClean="0"/>
+              <a:rPr lang="en-US"/>
               <a:t>Click to edit Master title style</a:t>
             </a:r>
             <a:endParaRPr lang="en-US" dirty="0"/>
@@ -6187,7 +6485,7 @@
           <a:p>
             <a:pPr lvl="0"/>
             <a:r>
-              <a:rPr lang="en-US" smtClean="0"/>
+              <a:rPr lang="en-US"/>
               <a:t>Click to edit Master text styles</a:t>
             </a:r>
           </a:p>
@@ -6215,35 +6513,35 @@
           <a:p>
             <a:pPr lvl="0"/>
             <a:r>
-              <a:rPr lang="en-US" smtClean="0"/>
+              <a:rPr lang="en-US"/>
               <a:t>Click to edit Master text styles</a:t>
             </a:r>
           </a:p>
           <a:p>
             <a:pPr lvl="1"/>
             <a:r>
-              <a:rPr lang="en-US" smtClean="0"/>
+              <a:rPr lang="en-US"/>
               <a:t>Second level</a:t>
             </a:r>
           </a:p>
           <a:p>
             <a:pPr lvl="2"/>
             <a:r>
-              <a:rPr lang="en-US" smtClean="0"/>
+              <a:rPr lang="en-US"/>
               <a:t>Third level</a:t>
             </a:r>
           </a:p>
           <a:p>
             <a:pPr lvl="3"/>
             <a:r>
-              <a:rPr lang="en-US" smtClean="0"/>
+              <a:rPr lang="en-US"/>
               <a:t>Fourth level</a:t>
             </a:r>
           </a:p>
           <a:p>
             <a:pPr lvl="4"/>
             <a:r>
-              <a:rPr lang="en-US" smtClean="0"/>
+              <a:rPr lang="en-US"/>
               <a:t>Fifth level</a:t>
             </a:r>
             <a:endParaRPr lang="en-US" dirty="0"/>
@@ -6309,7 +6607,7 @@
           <a:p>
             <a:pPr lvl="0"/>
             <a:r>
-              <a:rPr lang="en-US" smtClean="0"/>
+              <a:rPr lang="en-US"/>
               <a:t>Click to edit Master text styles</a:t>
             </a:r>
           </a:p>
@@ -6337,35 +6635,35 @@
           <a:p>
             <a:pPr lvl="0"/>
             <a:r>
-              <a:rPr lang="en-US" smtClean="0"/>
+              <a:rPr lang="en-US"/>
               <a:t>Click to edit Master text styles</a:t>
             </a:r>
           </a:p>
           <a:p>
             <a:pPr lvl="1"/>
             <a:r>
-              <a:rPr lang="en-US" smtClean="0"/>
+              <a:rPr lang="en-US"/>
               <a:t>Second level</a:t>
             </a:r>
           </a:p>
           <a:p>
             <a:pPr lvl="2"/>
             <a:r>
-              <a:rPr lang="en-US" smtClean="0"/>
+              <a:rPr lang="en-US"/>
               <a:t>Third level</a:t>
             </a:r>
           </a:p>
           <a:p>
             <a:pPr lvl="3"/>
             <a:r>
-              <a:rPr lang="en-US" smtClean="0"/>
+              <a:rPr lang="en-US"/>
               <a:t>Fourth level</a:t>
             </a:r>
           </a:p>
           <a:p>
             <a:pPr lvl="4"/>
             <a:r>
-              <a:rPr lang="en-US" smtClean="0"/>
+              <a:rPr lang="en-US"/>
               <a:t>Fifth level</a:t>
             </a:r>
             <a:endParaRPr lang="en-US" dirty="0"/>
@@ -6389,7 +6687,7 @@
           <a:p>
             <a:fld id="{51673806-0BCD-1F42-BAA8-2011034B3C6A}" type="datetimeFigureOut">
               <a:rPr lang="en-US" smtClean="0"/>
-              <a:t>5/7/21</a:t>
+              <a:t>5/14/21</a:t>
             </a:fld>
             <a:endParaRPr lang="en-US"/>
           </a:p>
@@ -6622,7 +6920,7 @@
           <a:lstStyle/>
           <a:p>
             <a:r>
-              <a:rPr lang="en-US" smtClean="0"/>
+              <a:rPr lang="en-US"/>
               <a:t>Click to edit Master title style</a:t>
             </a:r>
             <a:endParaRPr lang="en-US" dirty="0"/>
@@ -6646,7 +6944,7 @@
           <a:p>
             <a:fld id="{51673806-0BCD-1F42-BAA8-2011034B3C6A}" type="datetimeFigureOut">
               <a:rPr lang="en-US" smtClean="0"/>
-              <a:t>5/7/21</a:t>
+              <a:t>5/14/21</a:t>
             </a:fld>
             <a:endParaRPr lang="en-US"/>
           </a:p>
@@ -6804,7 +7102,7 @@
           <a:p>
             <a:fld id="{51673806-0BCD-1F42-BAA8-2011034B3C6A}" type="datetimeFigureOut">
               <a:rPr lang="en-US" smtClean="0"/>
-              <a:t>5/7/21</a:t>
+              <a:t>5/14/21</a:t>
             </a:fld>
             <a:endParaRPr lang="en-US"/>
           </a:p>
@@ -7048,7 +7346,7 @@
           </a:lstStyle>
           <a:p>
             <a:r>
-              <a:rPr lang="en-US" smtClean="0"/>
+              <a:rPr lang="en-US"/>
               <a:t>Click to edit Master title style</a:t>
             </a:r>
             <a:endParaRPr lang="en-US" dirty="0"/>
@@ -7077,35 +7375,35 @@
           <a:p>
             <a:pPr lvl="0"/>
             <a:r>
-              <a:rPr lang="en-US" smtClean="0"/>
+              <a:rPr lang="en-US"/>
               <a:t>Click to edit Master text styles</a:t>
             </a:r>
           </a:p>
           <a:p>
             <a:pPr lvl="1"/>
             <a:r>
-              <a:rPr lang="en-US" smtClean="0"/>
+              <a:rPr lang="en-US"/>
               <a:t>Second level</a:t>
             </a:r>
           </a:p>
           <a:p>
             <a:pPr lvl="2"/>
             <a:r>
-              <a:rPr lang="en-US" smtClean="0"/>
+              <a:rPr lang="en-US"/>
               <a:t>Third level</a:t>
             </a:r>
           </a:p>
           <a:p>
             <a:pPr lvl="3"/>
             <a:r>
-              <a:rPr lang="en-US" smtClean="0"/>
+              <a:rPr lang="en-US"/>
               <a:t>Fourth level</a:t>
             </a:r>
           </a:p>
           <a:p>
             <a:pPr lvl="4"/>
             <a:r>
-              <a:rPr lang="en-US" smtClean="0"/>
+              <a:rPr lang="en-US"/>
               <a:t>Fifth level</a:t>
             </a:r>
             <a:endParaRPr lang="en-US" dirty="0"/>
@@ -7171,7 +7469,7 @@
           <a:p>
             <a:pPr lvl="0"/>
             <a:r>
-              <a:rPr lang="en-US" smtClean="0"/>
+              <a:rPr lang="en-US"/>
               <a:t>Click to edit Master text styles</a:t>
             </a:r>
           </a:p>
@@ -7194,7 +7492,7 @@
           <a:p>
             <a:fld id="{51673806-0BCD-1F42-BAA8-2011034B3C6A}" type="datetimeFigureOut">
               <a:rPr lang="en-US" smtClean="0"/>
-              <a:t>5/7/21</a:t>
+              <a:t>5/14/21</a:t>
             </a:fld>
             <a:endParaRPr lang="en-US"/>
           </a:p>
@@ -7438,7 +7736,7 @@
           </a:lstStyle>
           <a:p>
             <a:r>
-              <a:rPr lang="en-US" smtClean="0"/>
+              <a:rPr lang="en-US"/>
               <a:t>Click to edit Master title style</a:t>
             </a:r>
             <a:endParaRPr lang="en-US" dirty="0"/>
@@ -7514,7 +7812,7 @@
           </a:lstStyle>
           <a:p>
             <a:r>
-              <a:rPr lang="en-US" smtClean="0"/>
+              <a:rPr lang="en-US"/>
               <a:t>Drag picture to placeholder or click icon to add</a:t>
             </a:r>
             <a:endParaRPr lang="en-US" dirty="0"/>
@@ -7580,7 +7878,7 @@
           <a:p>
             <a:pPr lvl="0"/>
             <a:r>
-              <a:rPr lang="en-US" smtClean="0"/>
+              <a:rPr lang="en-US"/>
               <a:t>Click to edit Master text styles</a:t>
             </a:r>
           </a:p>
@@ -7603,7 +7901,7 @@
           <a:p>
             <a:fld id="{51673806-0BCD-1F42-BAA8-2011034B3C6A}" type="datetimeFigureOut">
               <a:rPr lang="en-US" smtClean="0"/>
-              <a:t>5/7/21</a:t>
+              <a:t>5/14/21</a:t>
             </a:fld>
             <a:endParaRPr lang="en-US"/>
           </a:p>
@@ -7625,7 +7923,7 @@
           <a:lstStyle/>
           <a:p>
             <a:r>
-              <a:rPr lang="en-US" smtClean="0"/>
+              <a:rPr lang="en-US"/>
               <a:t>
               </a:t>
             </a:r>
@@ -7743,10 +8041,9 @@
           <a:lstStyle/>
           <a:p>
             <a:r>
-              <a:rPr lang="en-US" dirty="0" smtClean="0"/>
+              <a:rPr lang="en-US" dirty="0"/>
               <a:t>Click to edit Master title style</a:t>
             </a:r>
-            <a:endParaRPr lang="en-US" dirty="0"/>
           </a:p>
         </p:txBody>
       </p:sp>
@@ -7777,38 +8074,37 @@
           <a:p>
             <a:pPr lvl="0"/>
             <a:r>
-              <a:rPr lang="en-US" dirty="0" smtClean="0"/>
+              <a:rPr lang="en-US" dirty="0"/>
               <a:t>Click to edit Master text styles</a:t>
             </a:r>
           </a:p>
           <a:p>
             <a:pPr lvl="1"/>
             <a:r>
-              <a:rPr lang="en-US" dirty="0" smtClean="0"/>
+              <a:rPr lang="en-US" dirty="0"/>
               <a:t>Second level</a:t>
             </a:r>
           </a:p>
           <a:p>
             <a:pPr lvl="2"/>
             <a:r>
-              <a:rPr lang="en-US" dirty="0" smtClean="0"/>
+              <a:rPr lang="en-US" dirty="0"/>
               <a:t>Third level</a:t>
             </a:r>
           </a:p>
           <a:p>
             <a:pPr lvl="3"/>
             <a:r>
-              <a:rPr lang="en-US" dirty="0" smtClean="0"/>
+              <a:rPr lang="en-US" dirty="0"/>
               <a:t>Fourth level</a:t>
             </a:r>
           </a:p>
           <a:p>
             <a:pPr lvl="4"/>
             <a:r>
-              <a:rPr lang="en-US" dirty="0" smtClean="0"/>
+              <a:rPr lang="en-US" dirty="0"/>
               <a:t>Fifth level</a:t>
             </a:r>
-            <a:endParaRPr lang="en-US" dirty="0"/>
           </a:p>
         </p:txBody>
       </p:sp>
@@ -7851,7 +8147,7 @@
             <a:fld id="{51673806-0BCD-1F42-BAA8-2011034B3C6A}" type="datetimeFigureOut">
               <a:rPr lang="en-US" smtClean="0"/>
               <a:pPr/>
-              <a:t>5/7/21</a:t>
+              <a:t>5/14/21</a:t>
             </a:fld>
             <a:endParaRPr lang="en-US" dirty="0"/>
           </a:p>
@@ -8290,10 +8586,9 @@
           <a:lstStyle/>
           <a:p>
             <a:r>
-              <a:rPr lang="en-US" dirty="0" smtClean="0"/>
+              <a:rPr lang="en-US" dirty="0"/>
               <a:t>Multi-File Python Programs</a:t>
             </a:r>
-            <a:endParaRPr lang="en-US" dirty="0"/>
           </a:p>
         </p:txBody>
       </p:sp>
@@ -8316,11 +8611,7 @@
           <a:p>
             <a:r>
               <a:rPr lang="en-US"/>
-              <a:t>SURP </a:t>
-            </a:r>
-            <a:r>
-              <a:rPr lang="en-US" smtClean="0"/>
-              <a:t>2021 </a:t>
+              <a:t>SURP 2021 </a:t>
             </a:r>
             <a:r>
               <a:rPr lang="en-US" dirty="0"/>
@@ -8336,13 +8627,8 @@
           <a:p>
             <a:r>
               <a:rPr lang="en-US" dirty="0"/>
-              <a:t>Slides by: James W. </a:t>
-            </a:r>
-            <a:r>
-              <a:rPr lang="en-US" dirty="0" smtClean="0"/>
-              <a:t>Johnson</a:t>
-            </a:r>
-            <a:endParaRPr lang="en-US" dirty="0"/>
+              <a:t>Slides by: James W. Johnson</a:t>
+            </a:r>
           </a:p>
         </p:txBody>
       </p:sp>
@@ -8392,26 +8678,25 @@
           <a:lstStyle/>
           <a:p>
             <a:r>
-              <a:rPr lang="en-US" dirty="0" smtClean="0"/>
+              <a:rPr lang="en-US" dirty="0"/>
               <a:t>Other Contents of the __</a:t>
             </a:r>
             <a:r>
-              <a:rPr lang="en-US" dirty="0" err="1" smtClean="0"/>
+              <a:rPr lang="en-US" dirty="0" err="1"/>
               <a:t>init</a:t>
             </a:r>
             <a:r>
-              <a:rPr lang="en-US" dirty="0" smtClean="0"/>
+              <a:rPr lang="en-US" dirty="0"/>
               <a:t>__.</a:t>
             </a:r>
             <a:r>
-              <a:rPr lang="en-US" dirty="0" err="1" smtClean="0"/>
+              <a:rPr lang="en-US" dirty="0" err="1"/>
               <a:t>py</a:t>
             </a:r>
             <a:r>
-              <a:rPr lang="en-US" dirty="0" smtClean="0"/>
+              <a:rPr lang="en-US" dirty="0"/>
               <a:t> File </a:t>
             </a:r>
-            <a:endParaRPr lang="en-US" dirty="0"/>
           </a:p>
         </p:txBody>
       </p:sp>
@@ -8453,15 +8738,15 @@
               <a:defRPr/>
             </a:pPr>
             <a:r>
-              <a:rPr lang="en-US" i="1" dirty="0" smtClean="0"/>
+              <a:rPr lang="en-US" i="1" dirty="0"/>
               <a:t>__all__</a:t>
             </a:r>
             <a:r>
-              <a:rPr lang="en-US" dirty="0" smtClean="0"/>
+              <a:rPr lang="en-US" dirty="0"/>
               <a:t>: The names of the objects to import when you run </a:t>
             </a:r>
             <a:r>
-              <a:rPr lang="en-US" i="1" dirty="0" smtClean="0"/>
+              <a:rPr lang="en-US" i="1" dirty="0"/>
               <a:t>from ___ import * </a:t>
             </a:r>
           </a:p>
@@ -8503,7 +8788,7 @@
               <a:tabLst/>
               <a:defRPr/>
             </a:pPr>
-            <a:endParaRPr lang="en-US" dirty="0" smtClean="0"/>
+            <a:endParaRPr lang="en-US" dirty="0"/>
           </a:p>
           <a:p>
             <a:pPr marL="0" marR="0" lvl="0" indent="0" defTabSz="914400" eaLnBrk="1" fontAlgn="auto" latinLnBrk="0" hangingPunct="1">
@@ -8524,31 +8809,31 @@
               <a:defRPr/>
             </a:pPr>
             <a:r>
-              <a:rPr lang="en-US" dirty="0" smtClean="0"/>
+              <a:rPr lang="en-US" dirty="0"/>
               <a:t>Note: </a:t>
             </a:r>
             <a:r>
-              <a:rPr lang="en-US" i="1" dirty="0" smtClean="0"/>
+              <a:rPr lang="en-US" i="1" dirty="0"/>
               <a:t>from ____ import *</a:t>
             </a:r>
             <a:r>
-              <a:rPr lang="en-US" dirty="0" smtClean="0"/>
+              <a:rPr lang="en-US" dirty="0"/>
               <a:t> is considered bad practice anywhere other than inside of an __</a:t>
             </a:r>
             <a:r>
-              <a:rPr lang="en-US" dirty="0" err="1" smtClean="0"/>
+              <a:rPr lang="en-US" dirty="0" err="1"/>
               <a:t>init</a:t>
             </a:r>
             <a:r>
-              <a:rPr lang="en-US" dirty="0" smtClean="0"/>
+              <a:rPr lang="en-US" dirty="0"/>
               <a:t>__.</a:t>
             </a:r>
             <a:r>
-              <a:rPr lang="en-US" dirty="0" err="1" smtClean="0"/>
+              <a:rPr lang="en-US" dirty="0" err="1"/>
               <a:t>py</a:t>
             </a:r>
             <a:r>
-              <a:rPr lang="en-US" dirty="0" smtClean="0"/>
+              <a:rPr lang="en-US" dirty="0"/>
               <a:t> file. This is because it is possible to override function names and makes it difficult to keep track of your namespace. </a:t>
             </a:r>
           </a:p>
@@ -8591,34 +8876,33 @@
               <a:defRPr/>
             </a:pPr>
             <a:r>
-              <a:rPr lang="en-US" dirty="0" smtClean="0"/>
+              <a:rPr lang="en-US" dirty="0"/>
               <a:t>Example: If I call </a:t>
             </a:r>
             <a:r>
-              <a:rPr lang="en-US" i="1" dirty="0" smtClean="0"/>
+              <a:rPr lang="en-US" i="1" dirty="0"/>
               <a:t>log10</a:t>
             </a:r>
             <a:r>
-              <a:rPr lang="en-US" dirty="0" smtClean="0"/>
+              <a:rPr lang="en-US" dirty="0"/>
               <a:t>, do I get </a:t>
             </a:r>
             <a:r>
-              <a:rPr lang="en-US" i="1" dirty="0" smtClean="0"/>
+              <a:rPr lang="en-US" i="1" dirty="0"/>
               <a:t>math.log10</a:t>
             </a:r>
             <a:r>
-              <a:rPr lang="en-US" dirty="0" smtClean="0"/>
+              <a:rPr lang="en-US" dirty="0"/>
               <a:t> or </a:t>
             </a:r>
             <a:r>
-              <a:rPr lang="en-US" i="1" dirty="0" smtClean="0"/>
+              <a:rPr lang="en-US" i="1" dirty="0"/>
               <a:t>numpy.log10</a:t>
             </a:r>
             <a:r>
-              <a:rPr lang="en-US" dirty="0" smtClean="0"/>
+              <a:rPr lang="en-US" dirty="0"/>
               <a:t>? What if I swap the order? </a:t>
             </a:r>
-            <a:endParaRPr lang="en-US" dirty="0"/>
           </a:p>
         </p:txBody>
       </p:sp>
@@ -8698,10 +8982,9 @@
           <a:lstStyle/>
           <a:p>
             <a:r>
-              <a:rPr lang="en-US" dirty="0" smtClean="0"/>
+              <a:rPr lang="en-US" dirty="0"/>
               <a:t>An Example Package</a:t>
             </a:r>
-            <a:endParaRPr lang="en-US" dirty="0"/>
           </a:p>
         </p:txBody>
       </p:sp>
@@ -8743,27 +9026,27 @@
               <a:defRPr/>
             </a:pPr>
             <a:r>
-              <a:rPr lang="en-US" dirty="0" err="1" smtClean="0"/>
+              <a:rPr lang="en-US" dirty="0" err="1"/>
               <a:t>mypkg</a:t>
             </a:r>
             <a:r>
-              <a:rPr lang="en-US" dirty="0" smtClean="0"/>
+              <a:rPr lang="en-US" dirty="0"/>
               <a:t>/__</a:t>
             </a:r>
             <a:r>
-              <a:rPr lang="en-US" dirty="0" err="1" smtClean="0"/>
+              <a:rPr lang="en-US" dirty="0" err="1"/>
               <a:t>init</a:t>
             </a:r>
             <a:r>
-              <a:rPr lang="en-US" dirty="0" smtClean="0"/>
+              <a:rPr lang="en-US" dirty="0"/>
               <a:t>__.</a:t>
             </a:r>
             <a:r>
-              <a:rPr lang="en-US" dirty="0" err="1" smtClean="0"/>
+              <a:rPr lang="en-US" dirty="0" err="1"/>
               <a:t>py</a:t>
             </a:r>
             <a:r>
-              <a:rPr lang="en-US" dirty="0" smtClean="0"/>
+              <a:rPr lang="en-US" dirty="0"/>
               <a:t>: </a:t>
             </a:r>
           </a:p>
@@ -8805,7 +9088,7 @@
               <a:tabLst/>
               <a:defRPr/>
             </a:pPr>
-            <a:endParaRPr lang="en-US" dirty="0" smtClean="0"/>
+            <a:endParaRPr lang="en-US" dirty="0"/>
           </a:p>
           <a:p>
             <a:pPr marL="0" marR="0" lvl="0" indent="0" defTabSz="914400" eaLnBrk="1" fontAlgn="auto" latinLnBrk="0" hangingPunct="1">
@@ -8846,35 +9129,35 @@
               <a:defRPr/>
             </a:pPr>
             <a:r>
-              <a:rPr lang="en-US" dirty="0" err="1" smtClean="0"/>
+              <a:rPr lang="en-US" dirty="0" err="1"/>
               <a:t>mypkg</a:t>
             </a:r>
             <a:r>
-              <a:rPr lang="en-US" dirty="0" smtClean="0"/>
+              <a:rPr lang="en-US" dirty="0"/>
               <a:t>/</a:t>
             </a:r>
             <a:r>
-              <a:rPr lang="en-US" dirty="0" err="1" smtClean="0"/>
+              <a:rPr lang="en-US" dirty="0" err="1"/>
               <a:t>mathlib</a:t>
             </a:r>
             <a:r>
-              <a:rPr lang="en-US" dirty="0" smtClean="0"/>
+              <a:rPr lang="en-US" dirty="0"/>
               <a:t>/__</a:t>
             </a:r>
             <a:r>
-              <a:rPr lang="en-US" dirty="0" err="1" smtClean="0"/>
+              <a:rPr lang="en-US" dirty="0" err="1"/>
               <a:t>init</a:t>
             </a:r>
             <a:r>
-              <a:rPr lang="en-US" dirty="0" smtClean="0"/>
+              <a:rPr lang="en-US" dirty="0"/>
               <a:t>__.</a:t>
             </a:r>
             <a:r>
-              <a:rPr lang="en-US" dirty="0" err="1" smtClean="0"/>
+              <a:rPr lang="en-US" dirty="0" err="1"/>
               <a:t>py</a:t>
             </a:r>
             <a:r>
-              <a:rPr lang="en-US" dirty="0" smtClean="0"/>
+              <a:rPr lang="en-US" dirty="0"/>
               <a:t>: </a:t>
             </a:r>
           </a:p>
@@ -8916,7 +9199,7 @@
               <a:tabLst/>
               <a:defRPr/>
             </a:pPr>
-            <a:endParaRPr lang="en-US" dirty="0" smtClean="0"/>
+            <a:endParaRPr lang="en-US" dirty="0"/>
           </a:p>
           <a:p>
             <a:pPr marL="0" marR="0" lvl="0" indent="0" defTabSz="914400" eaLnBrk="1" fontAlgn="auto" latinLnBrk="0" hangingPunct="1">
@@ -8957,35 +9240,35 @@
               <a:defRPr/>
             </a:pPr>
             <a:r>
-              <a:rPr lang="en-US" dirty="0" err="1" smtClean="0"/>
+              <a:rPr lang="en-US" dirty="0" err="1"/>
               <a:t>mypkg</a:t>
             </a:r>
             <a:r>
-              <a:rPr lang="en-US" dirty="0" smtClean="0"/>
+              <a:rPr lang="en-US" dirty="0"/>
               <a:t>/</a:t>
             </a:r>
             <a:r>
-              <a:rPr lang="en-US" dirty="0" err="1" smtClean="0"/>
+              <a:rPr lang="en-US" dirty="0" err="1"/>
               <a:t>mydata</a:t>
             </a:r>
             <a:r>
-              <a:rPr lang="en-US" dirty="0" smtClean="0"/>
+              <a:rPr lang="en-US" dirty="0"/>
               <a:t>/__</a:t>
             </a:r>
             <a:r>
-              <a:rPr lang="en-US" dirty="0" err="1" smtClean="0"/>
+              <a:rPr lang="en-US" dirty="0" err="1"/>
               <a:t>init</a:t>
             </a:r>
             <a:r>
-              <a:rPr lang="en-US" dirty="0" smtClean="0"/>
+              <a:rPr lang="en-US" dirty="0"/>
               <a:t>__.</a:t>
             </a:r>
             <a:r>
-              <a:rPr lang="en-US" dirty="0" err="1" smtClean="0"/>
+              <a:rPr lang="en-US" dirty="0" err="1"/>
               <a:t>py</a:t>
             </a:r>
             <a:r>
-              <a:rPr lang="en-US" dirty="0" smtClean="0"/>
+              <a:rPr lang="en-US" dirty="0"/>
               <a:t>:</a:t>
             </a:r>
           </a:p>
@@ -9028,22 +9311,21 @@
               <a:defRPr/>
             </a:pPr>
             <a:r>
-              <a:rPr lang="en-US" dirty="0" smtClean="0"/>
+              <a:rPr lang="en-US" dirty="0"/>
               <a:t>Pop Quiz: What is the value of </a:t>
             </a:r>
             <a:r>
-              <a:rPr lang="en-US" i="1" dirty="0" err="1" smtClean="0"/>
+              <a:rPr lang="en-US" i="1" dirty="0" err="1"/>
               <a:t>mypkg</a:t>
             </a:r>
             <a:r>
-              <a:rPr lang="en-US" i="1" dirty="0" smtClean="0"/>
+              <a:rPr lang="en-US" i="1" dirty="0"/>
               <a:t>.__all__</a:t>
             </a:r>
             <a:r>
-              <a:rPr lang="en-US" dirty="0" smtClean="0"/>
+              <a:rPr lang="en-US" dirty="0"/>
               <a:t>? </a:t>
             </a:r>
-            <a:endParaRPr lang="en-US" dirty="0"/>
           </a:p>
         </p:txBody>
       </p:sp>
@@ -9079,7 +9361,7 @@
       </p:pic>
       <p:pic>
         <p:nvPicPr>
-          <p:cNvPr id="6" name="Picture 5"/>
+          <p:cNvPr id="8" name="Picture 7"/>
           <p:cNvPicPr>
             <a:picLocks noChangeAspect="1"/>
           </p:cNvPicPr>
@@ -9099,8 +9381,8 @@
         </p:blipFill>
         <p:spPr>
           <a:xfrm>
-            <a:off x="4347633" y="3715880"/>
-            <a:ext cx="6667500" cy="990600"/>
+            <a:off x="4480983" y="5209187"/>
+            <a:ext cx="3200400" cy="774700"/>
           </a:xfrm>
           <a:prstGeom prst="rect">
             <a:avLst/>
@@ -9109,28 +9391,28 @@
       </p:pic>
       <p:pic>
         <p:nvPicPr>
-          <p:cNvPr id="8" name="Picture 7"/>
+          <p:cNvPr id="7" name="Picture 6">
+            <a:extLst>
+              <a:ext uri="{FF2B5EF4-FFF2-40B4-BE49-F238E27FC236}">
+                <a16:creationId xmlns:a16="http://schemas.microsoft.com/office/drawing/2014/main" id="{2DBD86C7-6F5D-DC47-A44B-78EFC3BB6982}"/>
+              </a:ext>
+            </a:extLst>
+          </p:cNvPr>
           <p:cNvPicPr>
             <a:picLocks noChangeAspect="1"/>
           </p:cNvPicPr>
           <p:nvPr/>
         </p:nvPicPr>
         <p:blipFill>
-          <a:blip r:embed="rId5">
-            <a:extLst>
-              <a:ext uri="{28A0092B-C50C-407E-A947-70E740481C1C}">
-                <a14:useLocalDpi xmlns:a14="http://schemas.microsoft.com/office/drawing/2010/main" val="0"/>
-              </a:ext>
-            </a:extLst>
-          </a:blip>
+          <a:blip r:embed="rId5"/>
           <a:stretch>
             <a:fillRect/>
           </a:stretch>
         </p:blipFill>
         <p:spPr>
           <a:xfrm>
-            <a:off x="4480983" y="5209187"/>
-            <a:ext cx="3200400" cy="774700"/>
+            <a:off x="4567766" y="3514797"/>
+            <a:ext cx="6261100" cy="1358900"/>
           </a:xfrm>
           <a:prstGeom prst="rect">
             <a:avLst/>
@@ -9183,10 +9465,9 @@
           <a:lstStyle/>
           <a:p>
             <a:r>
-              <a:rPr lang="en-US" dirty="0" smtClean="0"/>
+              <a:rPr lang="en-US" dirty="0"/>
               <a:t>To Save You Time</a:t>
             </a:r>
-            <a:endParaRPr lang="en-US" dirty="0"/>
           </a:p>
         </p:txBody>
       </p:sp>
@@ -9223,15 +9504,15 @@
               <a:defRPr/>
             </a:pPr>
             <a:r>
-              <a:rPr lang="en-US" dirty="0" smtClean="0"/>
+              <a:rPr lang="en-US" dirty="0"/>
               <a:t>If you are spreading code out across multiple files, and get an </a:t>
             </a:r>
             <a:r>
-              <a:rPr lang="en-US" dirty="0" err="1" smtClean="0"/>
+              <a:rPr lang="en-US" dirty="0" err="1"/>
               <a:t>ImportError</a:t>
             </a:r>
             <a:r>
-              <a:rPr lang="en-US" dirty="0" smtClean="0"/>
+              <a:rPr lang="en-US" dirty="0"/>
               <a:t> stating that a given package or module cannot be imported, you may have two files both importing one another in the preamble. </a:t>
             </a:r>
           </a:p>
@@ -9273,7 +9554,7 @@
               <a:tabLst/>
               <a:defRPr/>
             </a:pPr>
-            <a:endParaRPr lang="en-US" dirty="0" smtClean="0"/>
+            <a:endParaRPr lang="en-US" dirty="0"/>
           </a:p>
           <a:p>
             <a:pPr marL="0" marR="0" lvl="0" indent="0" defTabSz="914400" eaLnBrk="1" fontAlgn="auto" latinLnBrk="0" hangingPunct="1">
@@ -9294,16 +9575,8 @@
               <a:defRPr/>
             </a:pPr>
             <a:r>
-              <a:rPr lang="en-US" dirty="0" smtClean="0"/>
-              <a:t>To solve this, move the import statement in one of the files to the functions which require it</a:t>
-            </a:r>
-            <a:r>
               <a:rPr lang="en-US" dirty="0"/>
-              <a:t> </a:t>
-            </a:r>
-            <a:r>
-              <a:rPr lang="en-US" dirty="0" smtClean="0"/>
-              <a:t>– there is no rule that says import statements need to be at the top; this is just convention. </a:t>
+              <a:t>To solve this, move the import statement in one of the files to the functions which require it – there is no rule that says import statements need to be at the top; this is just convention. </a:t>
             </a:r>
           </a:p>
         </p:txBody>
@@ -9354,18 +9627,17 @@
           <a:lstStyle/>
           <a:p>
             <a:r>
-              <a:rPr lang="en-US" dirty="0" smtClean="0"/>
+              <a:rPr lang="en-US" dirty="0"/>
               <a:t>The __main__.</a:t>
             </a:r>
             <a:r>
-              <a:rPr lang="en-US" dirty="0" err="1" smtClean="0"/>
+              <a:rPr lang="en-US" dirty="0" err="1"/>
               <a:t>py</a:t>
             </a:r>
             <a:r>
-              <a:rPr lang="en-US" dirty="0" smtClean="0"/>
+              <a:rPr lang="en-US" dirty="0"/>
               <a:t> File </a:t>
             </a:r>
-            <a:endParaRPr lang="en-US" dirty="0"/>
           </a:p>
         </p:txBody>
       </p:sp>
@@ -9407,27 +9679,27 @@
               <a:defRPr/>
             </a:pPr>
             <a:r>
-              <a:rPr lang="en-US" dirty="0" smtClean="0"/>
+              <a:rPr lang="en-US" dirty="0"/>
               <a:t>The file that gets ran when you </a:t>
             </a:r>
             <a:r>
-              <a:rPr lang="en-US" i="1" dirty="0" smtClean="0"/>
+              <a:rPr lang="en-US" i="1" dirty="0"/>
               <a:t>run</a:t>
             </a:r>
             <a:r>
-              <a:rPr lang="en-US" dirty="0" smtClean="0"/>
+              <a:rPr lang="en-US" dirty="0"/>
               <a:t> a directory (i.e. </a:t>
             </a:r>
             <a:r>
-              <a:rPr lang="en-US" i="1" dirty="0" smtClean="0"/>
+              <a:rPr lang="en-US" i="1" dirty="0"/>
               <a:t>python </a:t>
             </a:r>
             <a:r>
-              <a:rPr lang="en-US" i="1" dirty="0" err="1" smtClean="0"/>
+              <a:rPr lang="en-US" i="1" dirty="0" err="1"/>
               <a:t>mypkg</a:t>
             </a:r>
             <a:r>
-              <a:rPr lang="en-US" dirty="0" smtClean="0"/>
+              <a:rPr lang="en-US" dirty="0"/>
               <a:t>) </a:t>
             </a:r>
           </a:p>
@@ -9469,7 +9741,7 @@
               <a:tabLst/>
               <a:defRPr/>
             </a:pPr>
-            <a:endParaRPr lang="en-US" dirty="0" smtClean="0"/>
+            <a:endParaRPr lang="en-US" dirty="0"/>
           </a:p>
           <a:p>
             <a:pPr marL="0" marR="0" lvl="0" indent="0" defTabSz="914400" eaLnBrk="1" fontAlgn="auto" latinLnBrk="0" hangingPunct="1">
@@ -9510,19 +9782,19 @@
               <a:defRPr/>
             </a:pPr>
             <a:r>
-              <a:rPr lang="en-US" dirty="0" err="1" smtClean="0"/>
+              <a:rPr lang="en-US" dirty="0" err="1"/>
               <a:t>mypkg</a:t>
             </a:r>
             <a:r>
-              <a:rPr lang="en-US" dirty="0" smtClean="0"/>
+              <a:rPr lang="en-US" dirty="0"/>
               <a:t>/__main__.</a:t>
             </a:r>
             <a:r>
-              <a:rPr lang="en-US" dirty="0" err="1" smtClean="0"/>
+              <a:rPr lang="en-US" dirty="0" err="1"/>
               <a:t>py</a:t>
             </a:r>
             <a:r>
-              <a:rPr lang="en-US" dirty="0" smtClean="0"/>
+              <a:rPr lang="en-US" dirty="0"/>
               <a:t>: </a:t>
             </a:r>
           </a:p>
@@ -9564,7 +9836,7 @@
               <a:tabLst/>
               <a:defRPr/>
             </a:pPr>
-            <a:endParaRPr lang="en-US" dirty="0" smtClean="0"/>
+            <a:endParaRPr lang="en-US" dirty="0"/>
           </a:p>
           <a:p>
             <a:pPr marL="0" marR="0" lvl="0" indent="0" defTabSz="914400" eaLnBrk="1" fontAlgn="auto" latinLnBrk="0" hangingPunct="1">
@@ -9604,7 +9876,7 @@
               <a:tabLst/>
               <a:defRPr/>
             </a:pPr>
-            <a:endParaRPr lang="en-US" dirty="0" smtClean="0"/>
+            <a:endParaRPr lang="en-US" dirty="0"/>
           </a:p>
           <a:p>
             <a:pPr marL="0" marR="0" lvl="0" indent="0" defTabSz="914400" eaLnBrk="1" fontAlgn="auto" latinLnBrk="0" hangingPunct="1">
@@ -9624,7 +9896,7 @@
               <a:tabLst/>
               <a:defRPr/>
             </a:pPr>
-            <a:endParaRPr lang="en-US" dirty="0" smtClean="0"/>
+            <a:endParaRPr lang="en-US" dirty="0"/>
           </a:p>
           <a:p>
             <a:pPr marL="0" marR="0" lvl="0" indent="0" defTabSz="914400" eaLnBrk="1" fontAlgn="auto" latinLnBrk="0" hangingPunct="1">
@@ -9645,27 +9917,27 @@
               <a:defRPr/>
             </a:pPr>
             <a:r>
-              <a:rPr lang="en-US" dirty="0" smtClean="0"/>
+              <a:rPr lang="en-US" dirty="0"/>
               <a:t>Important: You </a:t>
             </a:r>
             <a:r>
-              <a:rPr lang="en-US" i="1" dirty="0" smtClean="0"/>
+              <a:rPr lang="en-US" i="1" dirty="0"/>
               <a:t>cannot </a:t>
             </a:r>
             <a:r>
-              <a:rPr lang="en-US" dirty="0" smtClean="0"/>
+              <a:rPr lang="en-US" dirty="0"/>
               <a:t>relative import in a </a:t>
             </a:r>
             <a:r>
-              <a:rPr lang="en-US" i="1" dirty="0" smtClean="0"/>
+              <a:rPr lang="en-US" i="1" dirty="0"/>
               <a:t>__main__.</a:t>
             </a:r>
             <a:r>
-              <a:rPr lang="en-US" i="1" dirty="0" err="1" smtClean="0"/>
+              <a:rPr lang="en-US" i="1" dirty="0" err="1"/>
               <a:t>py</a:t>
             </a:r>
             <a:r>
-              <a:rPr lang="en-US" dirty="0" smtClean="0"/>
+              <a:rPr lang="en-US" dirty="0"/>
               <a:t> file </a:t>
             </a:r>
           </a:p>
@@ -9707,7 +9979,7 @@
               <a:tabLst/>
               <a:defRPr/>
             </a:pPr>
-            <a:endParaRPr lang="en-US" dirty="0" smtClean="0"/>
+            <a:endParaRPr lang="en-US" dirty="0"/>
           </a:p>
           <a:p>
             <a:pPr marL="0" marR="0" lvl="0" indent="0" defTabSz="914400" eaLnBrk="1" fontAlgn="auto" latinLnBrk="0" hangingPunct="1">
@@ -9747,7 +10019,7 @@
               <a:tabLst/>
               <a:defRPr/>
             </a:pPr>
-            <a:endParaRPr lang="en-US" dirty="0" smtClean="0"/>
+            <a:endParaRPr lang="en-US" dirty="0"/>
           </a:p>
         </p:txBody>
       </p:sp>
@@ -9857,10 +10129,9 @@
           <a:lstStyle/>
           <a:p>
             <a:r>
-              <a:rPr lang="en-US" dirty="0" smtClean="0"/>
+              <a:rPr lang="en-US" dirty="0"/>
               <a:t>The Usefulness of your PYTHONPATH </a:t>
             </a:r>
-            <a:endParaRPr lang="en-US" dirty="0"/>
           </a:p>
         </p:txBody>
       </p:sp>
@@ -9897,15 +10168,15 @@
               <a:defRPr/>
             </a:pPr>
             <a:r>
-              <a:rPr lang="en-US" dirty="0" smtClean="0"/>
+              <a:rPr lang="en-US" dirty="0"/>
               <a:t>Put useful code in a given directory or set of directories, put those directories on your PYTHONPATH, and import that code from </a:t>
             </a:r>
             <a:r>
-              <a:rPr lang="en-US" i="1" dirty="0" smtClean="0"/>
+              <a:rPr lang="en-US" i="1" dirty="0"/>
               <a:t>anywhere</a:t>
             </a:r>
             <a:r>
-              <a:rPr lang="en-US" dirty="0" smtClean="0"/>
+              <a:rPr lang="en-US" dirty="0"/>
               <a:t> in your computer. </a:t>
             </a:r>
           </a:p>
@@ -9927,7 +10198,7 @@
               <a:tabLst/>
               <a:defRPr/>
             </a:pPr>
-            <a:endParaRPr lang="en-US" dirty="0" smtClean="0"/>
+            <a:endParaRPr lang="en-US" dirty="0"/>
           </a:p>
           <a:p>
             <a:pPr marL="0" marR="0" lvl="0" indent="0" defTabSz="914400" eaLnBrk="1" fontAlgn="auto" latinLnBrk="0" hangingPunct="1">
@@ -9947,7 +10218,7 @@
               <a:tabLst/>
               <a:defRPr/>
             </a:pPr>
-            <a:endParaRPr lang="en-US" dirty="0" smtClean="0"/>
+            <a:endParaRPr lang="en-US" dirty="0"/>
           </a:p>
           <a:p>
             <a:pPr marL="0" marR="0" lvl="0" indent="0" defTabSz="914400" eaLnBrk="1" fontAlgn="auto" latinLnBrk="0" hangingPunct="1">
@@ -9988,10 +10259,9 @@
               <a:defRPr/>
             </a:pPr>
             <a:r>
-              <a:rPr lang="en-US" dirty="0" smtClean="0"/>
+              <a:rPr lang="en-US" dirty="0"/>
               <a:t>You never have to write that code again! Take a guess how a software engineer would describe repeatedly writing similar code </a:t>
             </a:r>
-            <a:endParaRPr lang="en-US" dirty="0"/>
           </a:p>
         </p:txBody>
       </p:sp>
@@ -10041,10 +10311,9 @@
           <a:lstStyle/>
           <a:p>
             <a:r>
-              <a:rPr lang="en-US" dirty="0" smtClean="0"/>
+              <a:rPr lang="en-US" dirty="0"/>
               <a:t>The Usefulness of your PYTHONPATH </a:t>
             </a:r>
-            <a:endParaRPr lang="en-US" dirty="0"/>
           </a:p>
         </p:txBody>
       </p:sp>
@@ -10081,15 +10350,15 @@
               <a:defRPr/>
             </a:pPr>
             <a:r>
-              <a:rPr lang="en-US" dirty="0" smtClean="0"/>
+              <a:rPr lang="en-US" dirty="0"/>
               <a:t>Put useful code in a given directory or set of directories, put those directories on your PYTHONPATH, and import that code from </a:t>
             </a:r>
             <a:r>
-              <a:rPr lang="en-US" i="1" dirty="0" smtClean="0"/>
+              <a:rPr lang="en-US" i="1" dirty="0"/>
               <a:t>anywhere</a:t>
             </a:r>
             <a:r>
-              <a:rPr lang="en-US" dirty="0" smtClean="0"/>
+              <a:rPr lang="en-US" dirty="0"/>
               <a:t> in your computer. </a:t>
             </a:r>
           </a:p>
@@ -10111,7 +10380,7 @@
               <a:tabLst/>
               <a:defRPr/>
             </a:pPr>
-            <a:endParaRPr lang="en-US" dirty="0" smtClean="0"/>
+            <a:endParaRPr lang="en-US" dirty="0"/>
           </a:p>
           <a:p>
             <a:pPr marL="0" marR="0" lvl="0" indent="0" defTabSz="914400" eaLnBrk="1" fontAlgn="auto" latinLnBrk="0" hangingPunct="1">
@@ -10131,7 +10400,7 @@
               <a:tabLst/>
               <a:defRPr/>
             </a:pPr>
-            <a:endParaRPr lang="en-US" dirty="0" smtClean="0"/>
+            <a:endParaRPr lang="en-US" dirty="0"/>
           </a:p>
           <a:p>
             <a:pPr marL="0" marR="0" lvl="0" indent="0" defTabSz="914400" eaLnBrk="1" fontAlgn="auto" latinLnBrk="0" hangingPunct="1">
@@ -10166,23 +10435,7 @@
             </a:pPr>
             <a:r>
               <a:rPr lang="en-US" dirty="0"/>
-              <a:t>You never have to write that code again! Take a </a:t>
-            </a:r>
-            <a:r>
-              <a:rPr lang="en-US" dirty="0" smtClean="0"/>
-              <a:t>guess </a:t>
-            </a:r>
-            <a:r>
-              <a:rPr lang="en-US" dirty="0"/>
-              <a:t>how a software engineer would describe repeatedly writing similar </a:t>
-            </a:r>
-            <a:r>
-              <a:rPr lang="en-US" dirty="0" smtClean="0"/>
-              <a:t>code</a:t>
-            </a:r>
-            <a:r>
-              <a:rPr lang="en-US" dirty="0"/>
-              <a:t> </a:t>
+              <a:t>You never have to write that code again! Take a guess how a software engineer would describe repeatedly writing similar code </a:t>
             </a:r>
           </a:p>
           <a:p>
@@ -10204,10 +10457,9 @@
               <a:defRPr/>
             </a:pPr>
             <a:r>
-              <a:rPr lang="en-US" i="1" dirty="0" smtClean="0"/>
+              <a:rPr lang="en-US" i="1" dirty="0"/>
               <a:t>A waste of time</a:t>
             </a:r>
-            <a:endParaRPr lang="en-US" i="1" dirty="0"/>
           </a:p>
         </p:txBody>
       </p:sp>
@@ -10257,10 +10509,9 @@
           <a:lstStyle/>
           <a:p>
             <a:r>
-              <a:rPr lang="en-US" dirty="0" smtClean="0"/>
+              <a:rPr lang="en-US" dirty="0"/>
               <a:t>Import Statements: The Basics </a:t>
             </a:r>
-            <a:endParaRPr lang="en-US" dirty="0"/>
           </a:p>
         </p:txBody>
       </p:sp>
@@ -10304,7 +10555,7 @@
               <a:defRPr/>
             </a:pPr>
             <a:r>
-              <a:rPr lang="en-US" dirty="0" smtClean="0"/>
+              <a:rPr lang="en-US" dirty="0"/>
               <a:t>Used to load python objects from a separate file or set of files </a:t>
             </a:r>
           </a:p>
@@ -10367,23 +10618,23 @@
               <a:defRPr/>
             </a:pPr>
             <a:r>
-              <a:rPr lang="en-US" dirty="0" smtClean="0"/>
+              <a:rPr lang="en-US" dirty="0"/>
               <a:t>Analogous to </a:t>
             </a:r>
             <a:r>
-              <a:rPr lang="en-US" i="1" dirty="0" smtClean="0"/>
+              <a:rPr lang="en-US" i="1" dirty="0"/>
               <a:t>#include</a:t>
             </a:r>
             <a:r>
-              <a:rPr lang="en-US" dirty="0" smtClean="0"/>
+              <a:rPr lang="en-US" dirty="0"/>
               <a:t> and </a:t>
             </a:r>
             <a:r>
-              <a:rPr lang="en-US" i="1" dirty="0" smtClean="0"/>
+              <a:rPr lang="en-US" i="1" dirty="0"/>
               <a:t>using</a:t>
             </a:r>
             <a:r>
-              <a:rPr lang="en-US" dirty="0" smtClean="0"/>
+              <a:rPr lang="en-US" dirty="0"/>
               <a:t> in C/C++</a:t>
             </a:r>
           </a:p>
@@ -10425,7 +10676,7 @@
               <a:tabLst/>
               <a:defRPr/>
             </a:pPr>
-            <a:endParaRPr lang="en-US" dirty="0" smtClean="0"/>
+            <a:endParaRPr lang="en-US" dirty="0"/>
           </a:p>
           <a:p>
             <a:pPr marL="0" marR="0" lvl="0" indent="0" defTabSz="914400" eaLnBrk="1" fontAlgn="auto" latinLnBrk="0" hangingPunct="1">
@@ -10446,10 +10697,9 @@
               <a:defRPr/>
             </a:pPr>
             <a:r>
-              <a:rPr lang="en-US" dirty="0" smtClean="0"/>
+              <a:rPr lang="en-US" dirty="0"/>
               <a:t>Consider a simple example file to import:  </a:t>
             </a:r>
-            <a:endParaRPr lang="en-US" dirty="0"/>
           </a:p>
         </p:txBody>
       </p:sp>
@@ -10462,7 +10712,7 @@
           <p:nvPr/>
         </p:nvPicPr>
         <p:blipFill>
-          <a:blip r:embed="rId2">
+          <a:blip r:embed="rId3">
             <a:extLst>
               <a:ext uri="{28A0092B-C50C-407E-A947-70E740481C1C}">
                 <a14:useLocalDpi xmlns:a14="http://schemas.microsoft.com/office/drawing/2010/main" val="0"/>
@@ -10529,10 +10779,9 @@
           <a:lstStyle/>
           <a:p>
             <a:r>
-              <a:rPr lang="en-US" dirty="0" smtClean="0"/>
+              <a:rPr lang="en-US" dirty="0"/>
               <a:t>Import Statements: The Basics </a:t>
             </a:r>
-            <a:endParaRPr lang="en-US" dirty="0"/>
           </a:p>
         </p:txBody>
       </p:sp>
@@ -10576,7 +10825,7 @@
               <a:defRPr/>
             </a:pPr>
             <a:r>
-              <a:rPr lang="en-US" dirty="0" smtClean="0"/>
+              <a:rPr lang="en-US" dirty="0"/>
               <a:t>Consider a simple example file to import: </a:t>
             </a:r>
           </a:p>
@@ -10639,10 +10888,9 @@
               <a:defRPr/>
             </a:pPr>
             <a:r>
-              <a:rPr lang="en-US" dirty="0" smtClean="0"/>
+              <a:rPr lang="en-US" dirty="0"/>
               <a:t>This is what happens when we run it: </a:t>
             </a:r>
-            <a:endParaRPr lang="en-US" dirty="0"/>
           </a:p>
         </p:txBody>
       </p:sp>
@@ -10752,10 +11000,9 @@
           <a:lstStyle/>
           <a:p>
             <a:r>
-              <a:rPr lang="en-US" dirty="0" smtClean="0"/>
+              <a:rPr lang="en-US" dirty="0"/>
               <a:t>Import Statements: The Basics </a:t>
             </a:r>
-            <a:endParaRPr lang="en-US" dirty="0"/>
           </a:p>
         </p:txBody>
       </p:sp>
@@ -10799,7 +11046,7 @@
               <a:defRPr/>
             </a:pPr>
             <a:r>
-              <a:rPr lang="en-US" dirty="0" smtClean="0"/>
+              <a:rPr lang="en-US" dirty="0"/>
               <a:t>Consider a simple example file to import: </a:t>
             </a:r>
           </a:p>
@@ -10862,7 +11109,7 @@
               <a:defRPr/>
             </a:pPr>
             <a:r>
-              <a:rPr lang="en-US" dirty="0" smtClean="0"/>
+              <a:rPr lang="en-US" dirty="0"/>
               <a:t>This is what happens when we import it: </a:t>
             </a:r>
           </a:p>
@@ -10904,7 +11151,7 @@
               <a:tabLst/>
               <a:defRPr/>
             </a:pPr>
-            <a:endParaRPr lang="en-US" dirty="0" smtClean="0"/>
+            <a:endParaRPr lang="en-US" dirty="0"/>
           </a:p>
           <a:p>
             <a:pPr marL="0" marR="0" lvl="0" indent="0" defTabSz="914400" eaLnBrk="1" fontAlgn="auto" latinLnBrk="0" hangingPunct="1">
@@ -10945,11 +11192,11 @@
               <a:defRPr/>
             </a:pPr>
             <a:r>
-              <a:rPr lang="en-US" i="1" dirty="0" smtClean="0"/>
+              <a:rPr lang="en-US" i="1" dirty="0"/>
               <a:t>if __name__ == “__main__”</a:t>
             </a:r>
             <a:r>
-              <a:rPr lang="en-US" dirty="0" smtClean="0"/>
+              <a:rPr lang="en-US" dirty="0"/>
               <a:t> won’t run if the file is imported </a:t>
             </a:r>
             <a:endParaRPr lang="en-US" i="1" dirty="0"/>
@@ -11062,10 +11309,9 @@
           <a:lstStyle/>
           <a:p>
             <a:r>
-              <a:rPr lang="en-US" dirty="0" smtClean="0"/>
+              <a:rPr lang="en-US" dirty="0"/>
               <a:t>Import Statements: The Basics </a:t>
             </a:r>
-            <a:endParaRPr lang="en-US" dirty="0"/>
           </a:p>
         </p:txBody>
       </p:sp>
@@ -11109,7 +11355,7 @@
               <a:defRPr/>
             </a:pPr>
             <a:r>
-              <a:rPr lang="en-US" dirty="0" smtClean="0"/>
+              <a:rPr lang="en-US" dirty="0"/>
               <a:t>Other import formats:</a:t>
             </a:r>
           </a:p>
@@ -11151,7 +11397,7 @@
               <a:tabLst/>
               <a:defRPr/>
             </a:pPr>
-            <a:endParaRPr lang="en-US" dirty="0" smtClean="0"/>
+            <a:endParaRPr lang="en-US" dirty="0"/>
           </a:p>
           <a:p>
             <a:pPr marL="0" marR="0" lvl="0" indent="0" defTabSz="914400" eaLnBrk="1" fontAlgn="auto" latinLnBrk="0" hangingPunct="1">
@@ -11191,7 +11437,7 @@
               <a:tabLst/>
               <a:defRPr/>
             </a:pPr>
-            <a:endParaRPr lang="en-US" dirty="0" smtClean="0"/>
+            <a:endParaRPr lang="en-US" dirty="0"/>
           </a:p>
           <a:p>
             <a:pPr marL="0" marR="0" lvl="0" indent="0" defTabSz="914400" eaLnBrk="1" fontAlgn="auto" latinLnBrk="0" hangingPunct="1">
@@ -11231,7 +11477,7 @@
               <a:tabLst/>
               <a:defRPr/>
             </a:pPr>
-            <a:endParaRPr lang="en-US" dirty="0" smtClean="0"/>
+            <a:endParaRPr lang="en-US" dirty="0"/>
           </a:p>
           <a:p>
             <a:pPr marL="0" marR="0" lvl="0" indent="0" defTabSz="914400" eaLnBrk="1" fontAlgn="auto" latinLnBrk="0" hangingPunct="1">
@@ -11251,7 +11497,7 @@
               <a:tabLst/>
               <a:defRPr/>
             </a:pPr>
-            <a:endParaRPr lang="en-US" dirty="0" smtClean="0"/>
+            <a:endParaRPr lang="en-US" dirty="0"/>
           </a:p>
           <a:p>
             <a:pPr marL="0" marR="0" lvl="0" indent="0" defTabSz="914400" eaLnBrk="1" fontAlgn="auto" latinLnBrk="0" hangingPunct="1">
@@ -11272,10 +11518,9 @@
               <a:defRPr/>
             </a:pPr>
             <a:r>
-              <a:rPr lang="en-US" dirty="0" smtClean="0"/>
+              <a:rPr lang="en-US" dirty="0"/>
               <a:t>The file is always ran once </a:t>
             </a:r>
-            <a:endParaRPr lang="en-US" dirty="0"/>
           </a:p>
           <a:p>
             <a:pPr marL="0" marR="0" lvl="0" indent="0" defTabSz="914400" eaLnBrk="1" fontAlgn="auto" latinLnBrk="0" hangingPunct="1">
@@ -11295,7 +11540,7 @@
               <a:tabLst/>
               <a:defRPr/>
             </a:pPr>
-            <a:endParaRPr lang="en-US" dirty="0" smtClean="0"/>
+            <a:endParaRPr lang="en-US" dirty="0"/>
           </a:p>
         </p:txBody>
       </p:sp>
@@ -11405,26 +11650,25 @@
           <a:lstStyle/>
           <a:p>
             <a:r>
-              <a:rPr lang="en-US" dirty="0" smtClean="0"/>
+              <a:rPr lang="en-US" dirty="0"/>
               <a:t>The __</a:t>
             </a:r>
             <a:r>
-              <a:rPr lang="en-US" dirty="0" err="1" smtClean="0"/>
+              <a:rPr lang="en-US" dirty="0" err="1"/>
               <a:t>init</a:t>
             </a:r>
             <a:r>
-              <a:rPr lang="en-US" dirty="0" smtClean="0"/>
+              <a:rPr lang="en-US" dirty="0"/>
               <a:t>__.</a:t>
             </a:r>
             <a:r>
-              <a:rPr lang="en-US" dirty="0" err="1" smtClean="0"/>
+              <a:rPr lang="en-US" dirty="0" err="1"/>
               <a:t>py</a:t>
             </a:r>
             <a:r>
-              <a:rPr lang="en-US" dirty="0" smtClean="0"/>
+              <a:rPr lang="en-US" dirty="0"/>
               <a:t> file </a:t>
             </a:r>
-            <a:endParaRPr lang="en-US" dirty="0"/>
           </a:p>
         </p:txBody>
       </p:sp>
@@ -11452,15 +11696,9 @@
               <a:buNone/>
             </a:pPr>
             <a:r>
-              <a:rPr lang="en-US" dirty="0" smtClean="0"/>
+              <a:rPr lang="en-US" dirty="0"/>
               <a:t>Allows you to import an entire directory </a:t>
             </a:r>
-          </a:p>
-          <a:p>
-            <a:pPr marL="0" indent="0">
-              <a:buNone/>
-            </a:pPr>
-            <a:endParaRPr lang="en-US" dirty="0" smtClean="0"/>
           </a:p>
           <a:p>
             <a:pPr marL="0" indent="0">
@@ -11472,16 +11710,16 @@
             <a:pPr marL="0" indent="0">
               <a:buNone/>
             </a:pPr>
-            <a:r>
-              <a:rPr lang="en-US" dirty="0" smtClean="0"/>
+            <a:endParaRPr lang="en-US" dirty="0"/>
+          </a:p>
+          <a:p>
+            <a:pPr marL="0" indent="0">
+              <a:buNone/>
+            </a:pPr>
+            <a:r>
+              <a:rPr lang="en-US" dirty="0"/>
               <a:t>This is how you create python packages </a:t>
             </a:r>
-          </a:p>
-          <a:p>
-            <a:pPr marL="0" indent="0">
-              <a:buNone/>
-            </a:pPr>
-            <a:endParaRPr lang="en-US" dirty="0" smtClean="0"/>
           </a:p>
           <a:p>
             <a:pPr marL="0" indent="0">
@@ -11493,59 +11731,64 @@
             <a:pPr marL="0" indent="0">
               <a:buNone/>
             </a:pPr>
-            <a:r>
-              <a:rPr lang="en-US" dirty="0" smtClean="0"/>
+            <a:endParaRPr lang="en-US" dirty="0"/>
+          </a:p>
+          <a:p>
+            <a:pPr marL="0" indent="0">
+              <a:buNone/>
+            </a:pPr>
+            <a:r>
+              <a:rPr lang="en-US" dirty="0"/>
               <a:t>There is no file in your computer named </a:t>
             </a:r>
             <a:r>
-              <a:rPr lang="en-US" dirty="0" err="1" smtClean="0"/>
+              <a:rPr lang="en-US" dirty="0" err="1"/>
               <a:t>numpy.py</a:t>
             </a:r>
             <a:r>
-              <a:rPr lang="en-US" dirty="0" smtClean="0"/>
+              <a:rPr lang="en-US" dirty="0"/>
               <a:t>, but there is a file named </a:t>
             </a:r>
             <a:r>
-              <a:rPr lang="en-US" dirty="0" err="1" smtClean="0"/>
+              <a:rPr lang="en-US" dirty="0" err="1"/>
               <a:t>numpy</a:t>
             </a:r>
             <a:r>
-              <a:rPr lang="en-US" dirty="0" smtClean="0"/>
+              <a:rPr lang="en-US" dirty="0"/>
               <a:t>/__</a:t>
             </a:r>
             <a:r>
-              <a:rPr lang="en-US" dirty="0" err="1" smtClean="0"/>
+              <a:rPr lang="en-US" dirty="0" err="1"/>
               <a:t>init</a:t>
             </a:r>
             <a:r>
-              <a:rPr lang="en-US" dirty="0" smtClean="0"/>
+              <a:rPr lang="en-US" dirty="0"/>
               <a:t>__.</a:t>
             </a:r>
             <a:r>
-              <a:rPr lang="en-US" dirty="0" err="1" smtClean="0"/>
+              <a:rPr lang="en-US" dirty="0" err="1"/>
               <a:t>py</a:t>
             </a:r>
             <a:r>
-              <a:rPr lang="en-US" dirty="0" smtClean="0"/>
+              <a:rPr lang="en-US" dirty="0"/>
               <a:t>. The same goes for </a:t>
             </a:r>
             <a:r>
-              <a:rPr lang="en-US" dirty="0" err="1" smtClean="0"/>
+              <a:rPr lang="en-US" dirty="0" err="1"/>
               <a:t>scipy</a:t>
             </a:r>
             <a:r>
-              <a:rPr lang="en-US" dirty="0" smtClean="0"/>
+              <a:rPr lang="en-US" dirty="0"/>
               <a:t>, </a:t>
             </a:r>
             <a:r>
-              <a:rPr lang="en-US" dirty="0" err="1" smtClean="0"/>
+              <a:rPr lang="en-US" dirty="0" err="1"/>
               <a:t>matplotlib</a:t>
             </a:r>
             <a:r>
-              <a:rPr lang="en-US" dirty="0" smtClean="0"/>
+              <a:rPr lang="en-US" dirty="0"/>
               <a:t>, pandas, etc. </a:t>
             </a:r>
-            <a:endParaRPr lang="en-US" dirty="0"/>
           </a:p>
         </p:txBody>
       </p:sp>
@@ -11595,10 +11838,9 @@
           <a:lstStyle/>
           <a:p>
             <a:r>
-              <a:rPr lang="en-US" dirty="0" smtClean="0"/>
+              <a:rPr lang="en-US" dirty="0"/>
               <a:t>An Example Package </a:t>
             </a:r>
-            <a:endParaRPr lang="en-US" dirty="0"/>
           </a:p>
         </p:txBody>
       </p:sp>
@@ -11640,22 +11882,22 @@
               <a:defRPr/>
             </a:pPr>
             <a:r>
-              <a:rPr lang="en-US" dirty="0" smtClean="0"/>
+              <a:rPr lang="en-US" dirty="0"/>
               <a:t>Located in the </a:t>
             </a:r>
             <a:r>
-              <a:rPr lang="en-US" dirty="0" err="1" smtClean="0"/>
+              <a:rPr lang="en-US" dirty="0" err="1"/>
               <a:t>git</a:t>
             </a:r>
             <a:r>
-              <a:rPr lang="en-US" dirty="0" smtClean="0"/>
+              <a:rPr lang="en-US" dirty="0"/>
               <a:t> repository at examples/</a:t>
             </a:r>
             <a:r>
-              <a:rPr lang="en-US" dirty="0" err="1" smtClean="0"/>
+              <a:rPr lang="en-US" dirty="0" err="1"/>
               <a:t>mypkg</a:t>
             </a:r>
-            <a:endParaRPr lang="en-US" dirty="0" smtClean="0"/>
+            <a:endParaRPr lang="en-US" dirty="0"/>
           </a:p>
           <a:p>
             <a:pPr marL="0" marR="0" lvl="0" indent="0" defTabSz="914400" eaLnBrk="1" fontAlgn="auto" latinLnBrk="0" hangingPunct="1">
@@ -11696,23 +11938,23 @@
               <a:defRPr/>
             </a:pPr>
             <a:r>
-              <a:rPr lang="en-US" dirty="0" smtClean="0"/>
+              <a:rPr lang="en-US" dirty="0"/>
               <a:t>The __</a:t>
             </a:r>
             <a:r>
-              <a:rPr lang="en-US" dirty="0" err="1" smtClean="0"/>
+              <a:rPr lang="en-US" dirty="0" err="1"/>
               <a:t>init</a:t>
             </a:r>
             <a:r>
-              <a:rPr lang="en-US" dirty="0" smtClean="0"/>
+              <a:rPr lang="en-US" dirty="0"/>
               <a:t>__.</a:t>
             </a:r>
             <a:r>
-              <a:rPr lang="en-US" dirty="0" err="1" smtClean="0"/>
+              <a:rPr lang="en-US" dirty="0" err="1"/>
               <a:t>py</a:t>
             </a:r>
             <a:r>
-              <a:rPr lang="en-US" dirty="0" smtClean="0"/>
+              <a:rPr lang="en-US" dirty="0"/>
               <a:t> file: 			</a:t>
             </a:r>
           </a:p>
@@ -11754,7 +11996,7 @@
               <a:tabLst/>
               <a:defRPr/>
             </a:pPr>
-            <a:endParaRPr lang="en-US" dirty="0" smtClean="0"/>
+            <a:endParaRPr lang="en-US" dirty="0"/>
           </a:p>
           <a:p>
             <a:pPr marL="0" marR="0" lvl="0" indent="0" defTabSz="914400" eaLnBrk="1" fontAlgn="auto" latinLnBrk="0" hangingPunct="1">
@@ -11774,7 +12016,7 @@
               <a:tabLst/>
               <a:defRPr/>
             </a:pPr>
-            <a:endParaRPr lang="en-US" dirty="0" smtClean="0"/>
+            <a:endParaRPr lang="en-US" dirty="0"/>
           </a:p>
           <a:p>
             <a:pPr marL="0" marR="0" lvl="0" indent="0" defTabSz="914400" eaLnBrk="1" fontAlgn="auto" latinLnBrk="0" hangingPunct="1">
@@ -11795,10 +12037,9 @@
               <a:defRPr/>
             </a:pPr>
             <a:r>
-              <a:rPr lang="en-US" dirty="0" smtClean="0"/>
+              <a:rPr lang="en-US" dirty="0"/>
               <a:t>What this looks like in a Finder window:</a:t>
             </a:r>
-            <a:endParaRPr lang="en-US" dirty="0"/>
           </a:p>
         </p:txBody>
       </p:sp>
@@ -11908,10 +12149,9 @@
           <a:lstStyle/>
           <a:p>
             <a:r>
-              <a:rPr lang="en-US" dirty="0" smtClean="0"/>
+              <a:rPr lang="en-US" dirty="0"/>
               <a:t>An Example Package </a:t>
             </a:r>
-            <a:endParaRPr lang="en-US" dirty="0"/>
           </a:p>
         </p:txBody>
       </p:sp>
@@ -11953,31 +12193,31 @@
               <a:defRPr/>
             </a:pPr>
             <a:r>
-              <a:rPr lang="en-US" dirty="0" smtClean="0"/>
+              <a:rPr lang="en-US" dirty="0"/>
               <a:t>The </a:t>
             </a:r>
             <a:r>
-              <a:rPr lang="en-US" dirty="0" err="1" smtClean="0"/>
+              <a:rPr lang="en-US" dirty="0" err="1"/>
               <a:t>mathlib</a:t>
             </a:r>
             <a:r>
-              <a:rPr lang="en-US" dirty="0" smtClean="0"/>
+              <a:rPr lang="en-US" dirty="0"/>
               <a:t>/__</a:t>
             </a:r>
             <a:r>
-              <a:rPr lang="en-US" dirty="0" err="1" smtClean="0"/>
+              <a:rPr lang="en-US" dirty="0" err="1"/>
               <a:t>init</a:t>
             </a:r>
             <a:r>
-              <a:rPr lang="en-US" dirty="0" smtClean="0"/>
+              <a:rPr lang="en-US" dirty="0"/>
               <a:t>__.</a:t>
             </a:r>
             <a:r>
-              <a:rPr lang="en-US" dirty="0" err="1" smtClean="0"/>
+              <a:rPr lang="en-US" dirty="0" err="1"/>
               <a:t>py</a:t>
             </a:r>
             <a:r>
-              <a:rPr lang="en-US" dirty="0" smtClean="0"/>
+              <a:rPr lang="en-US" dirty="0"/>
               <a:t> file:</a:t>
             </a:r>
           </a:p>
@@ -12019,7 +12259,7 @@
               <a:tabLst/>
               <a:defRPr/>
             </a:pPr>
-            <a:endParaRPr lang="en-US" dirty="0" smtClean="0"/>
+            <a:endParaRPr lang="en-US" dirty="0"/>
           </a:p>
           <a:p>
             <a:pPr marL="0" marR="0" lvl="0" indent="0" defTabSz="914400" eaLnBrk="1" fontAlgn="auto" latinLnBrk="0" hangingPunct="1">
@@ -12059,7 +12299,7 @@
               <a:tabLst/>
               <a:defRPr/>
             </a:pPr>
-            <a:endParaRPr lang="en-US" dirty="0" smtClean="0"/>
+            <a:endParaRPr lang="en-US" dirty="0"/>
           </a:p>
           <a:p>
             <a:pPr marL="0" marR="0" lvl="0" indent="0" defTabSz="914400" eaLnBrk="1" fontAlgn="auto" latinLnBrk="0" hangingPunct="1">
@@ -12100,31 +12340,31 @@
               <a:defRPr/>
             </a:pPr>
             <a:r>
-              <a:rPr lang="en-US" dirty="0" smtClean="0"/>
+              <a:rPr lang="en-US" dirty="0"/>
               <a:t>The </a:t>
             </a:r>
             <a:r>
-              <a:rPr lang="en-US" dirty="0" err="1" smtClean="0"/>
+              <a:rPr lang="en-US" dirty="0" err="1"/>
               <a:t>mydata</a:t>
             </a:r>
             <a:r>
-              <a:rPr lang="en-US" dirty="0" smtClean="0"/>
+              <a:rPr lang="en-US" dirty="0"/>
               <a:t>/__</a:t>
             </a:r>
             <a:r>
-              <a:rPr lang="en-US" dirty="0" err="1" smtClean="0"/>
+              <a:rPr lang="en-US" dirty="0" err="1"/>
               <a:t>init</a:t>
             </a:r>
             <a:r>
-              <a:rPr lang="en-US" dirty="0" smtClean="0"/>
+              <a:rPr lang="en-US" dirty="0"/>
               <a:t>__.</a:t>
             </a:r>
             <a:r>
-              <a:rPr lang="en-US" dirty="0" err="1" smtClean="0"/>
+              <a:rPr lang="en-US" dirty="0" err="1"/>
               <a:t>py</a:t>
             </a:r>
             <a:r>
-              <a:rPr lang="en-US" dirty="0" smtClean="0"/>
+              <a:rPr lang="en-US" dirty="0"/>
               <a:t> file: </a:t>
             </a:r>
           </a:p>
@@ -12146,7 +12386,7 @@
               <a:tabLst/>
               <a:defRPr/>
             </a:pPr>
-            <a:endParaRPr lang="en-US" dirty="0" smtClean="0"/>
+            <a:endParaRPr lang="en-US" dirty="0"/>
           </a:p>
           <a:p>
             <a:pPr marL="0" marR="0" lvl="0" indent="0" defTabSz="914400" eaLnBrk="1" fontAlgn="auto" latinLnBrk="0" hangingPunct="1">
@@ -12179,7 +12419,7 @@
           <p:nvPr/>
         </p:nvPicPr>
         <p:blipFill>
-          <a:blip r:embed="rId2">
+          <a:blip r:embed="rId3">
             <a:extLst>
               <a:ext uri="{28A0092B-C50C-407E-A947-70E740481C1C}">
                 <a14:useLocalDpi xmlns:a14="http://schemas.microsoft.com/office/drawing/2010/main" val="0"/>
@@ -12209,7 +12449,7 @@
           <p:nvPr/>
         </p:nvPicPr>
         <p:blipFill>
-          <a:blip r:embed="rId3">
+          <a:blip r:embed="rId4">
             <a:extLst>
               <a:ext uri="{28A0092B-C50C-407E-A947-70E740481C1C}">
                 <a14:useLocalDpi xmlns:a14="http://schemas.microsoft.com/office/drawing/2010/main" val="0"/>
@@ -12276,10 +12516,9 @@
           <a:lstStyle/>
           <a:p>
             <a:r>
-              <a:rPr lang="en-US" dirty="0" smtClean="0"/>
+              <a:rPr lang="en-US" dirty="0"/>
               <a:t>Relative Imports </a:t>
             </a:r>
-            <a:endParaRPr lang="en-US" dirty="0"/>
           </a:p>
         </p:txBody>
       </p:sp>
@@ -12323,7 +12562,7 @@
               <a:defRPr/>
             </a:pPr>
             <a:r>
-              <a:rPr lang="en-US" dirty="0" smtClean="0"/>
+              <a:rPr lang="en-US" dirty="0"/>
               <a:t>Special syntax telling python exactly where to look within your package </a:t>
             </a:r>
           </a:p>
@@ -12345,7 +12584,7 @@
               <a:tabLst/>
               <a:defRPr/>
             </a:pPr>
-            <a:endParaRPr lang="en-US" dirty="0" smtClean="0"/>
+            <a:endParaRPr lang="en-US" dirty="0"/>
           </a:p>
           <a:p>
             <a:pPr marL="0" marR="0" lvl="0" indent="0" algn="ctr" defTabSz="914400" eaLnBrk="1" fontAlgn="auto" latinLnBrk="0" hangingPunct="1">
@@ -12366,15 +12605,15 @@
               <a:defRPr/>
             </a:pPr>
             <a:r>
-              <a:rPr lang="en-US" i="1" dirty="0" smtClean="0"/>
+              <a:rPr lang="en-US" i="1" dirty="0"/>
               <a:t>from .</a:t>
             </a:r>
             <a:r>
-              <a:rPr lang="en-US" i="1" dirty="0" err="1" smtClean="0"/>
+              <a:rPr lang="en-US" i="1" dirty="0" err="1"/>
               <a:t>somefile</a:t>
             </a:r>
             <a:r>
-              <a:rPr lang="en-US" i="1" dirty="0" smtClean="0"/>
+              <a:rPr lang="en-US" i="1" dirty="0"/>
               <a:t> import something </a:t>
             </a:r>
           </a:p>
@@ -12397,22 +12636,22 @@
               <a:defRPr/>
             </a:pPr>
             <a:r>
-              <a:rPr lang="en-US" i="1" dirty="0" smtClean="0"/>
+              <a:rPr lang="en-US" i="1" dirty="0"/>
               <a:t>from ..</a:t>
             </a:r>
             <a:r>
-              <a:rPr lang="en-US" i="1" dirty="0" err="1" smtClean="0"/>
+              <a:rPr lang="en-US" i="1" dirty="0" err="1"/>
               <a:t>somedirectory</a:t>
             </a:r>
             <a:r>
-              <a:rPr lang="en-US" i="1" dirty="0" smtClean="0"/>
+              <a:rPr lang="en-US" i="1" dirty="0"/>
               <a:t> import </a:t>
             </a:r>
             <a:r>
-              <a:rPr lang="en-US" i="1" dirty="0" err="1" smtClean="0"/>
+              <a:rPr lang="en-US" i="1" dirty="0" err="1"/>
               <a:t>something_else</a:t>
             </a:r>
-            <a:endParaRPr lang="en-US" i="1" dirty="0" smtClean="0"/>
+            <a:endParaRPr lang="en-US" i="1" dirty="0"/>
           </a:p>
           <a:p>
             <a:pPr marL="0" marR="0" lvl="0" indent="0" defTabSz="914400" eaLnBrk="1" fontAlgn="auto" latinLnBrk="0" hangingPunct="1">
@@ -12432,7 +12671,7 @@
               <a:tabLst/>
               <a:defRPr/>
             </a:pPr>
-            <a:endParaRPr lang="en-US" dirty="0" smtClean="0"/>
+            <a:endParaRPr lang="en-US" dirty="0"/>
           </a:p>
           <a:p>
             <a:pPr marL="0" marR="0" lvl="0" indent="0" defTabSz="914400" eaLnBrk="1" fontAlgn="auto" latinLnBrk="0" hangingPunct="1">
@@ -12473,7 +12712,7 @@
               <a:defRPr/>
             </a:pPr>
             <a:r>
-              <a:rPr lang="en-US" dirty="0" smtClean="0"/>
+              <a:rPr lang="en-US" dirty="0"/>
               <a:t>The number of dots specifies the directory: one for same directory, two for parent directory, three for parent directory’s parent directory, etc. </a:t>
             </a:r>
           </a:p>
@@ -12516,40 +12755,24 @@
               <a:defRPr/>
             </a:pPr>
             <a:r>
-              <a:rPr lang="en-US" dirty="0" smtClean="0"/>
+              <a:rPr lang="en-US" dirty="0"/>
               <a:t>Blank __</a:t>
             </a:r>
             <a:r>
-              <a:rPr lang="en-US" dirty="0" err="1" smtClean="0"/>
+              <a:rPr lang="en-US" dirty="0" err="1"/>
               <a:t>init</a:t>
             </a:r>
             <a:r>
-              <a:rPr lang="en-US" dirty="0" smtClean="0"/>
+              <a:rPr lang="en-US" dirty="0"/>
               <a:t>__.</a:t>
             </a:r>
             <a:r>
-              <a:rPr lang="en-US" dirty="0" err="1" smtClean="0"/>
+              <a:rPr lang="en-US" dirty="0" err="1"/>
               <a:t>py</a:t>
             </a:r>
             <a:r>
-              <a:rPr lang="en-US" dirty="0" smtClean="0"/>
-              <a:t> files are often included to note that the contents of a directory are still an important part of the package. What else is in the </a:t>
-            </a:r>
-            <a:r>
-              <a:rPr lang="en-US" dirty="0" err="1" smtClean="0"/>
-              <a:t>mypkg</a:t>
-            </a:r>
-            <a:r>
-              <a:rPr lang="en-US" dirty="0" smtClean="0"/>
-              <a:t>/</a:t>
-            </a:r>
-            <a:r>
-              <a:rPr lang="en-US" dirty="0" err="1" smtClean="0"/>
-              <a:t>mydata</a:t>
-            </a:r>
-            <a:r>
-              <a:rPr lang="en-US" dirty="0" smtClean="0"/>
-              <a:t> directory? </a:t>
+              <a:rPr lang="en-US" dirty="0"/>
+              <a:t> files are often included to note that the contents of a directory are still an important part of the package. These directories often contain data files. </a:t>
             </a:r>
           </a:p>
         </p:txBody>

</xml_diff>

<commit_message>
slides: minor session 3 revisions, additional examples for session 4
</commit_message>
<xml_diff>
--- a/slides/imports.pptx
+++ b/slides/imports.pptx
@@ -211,7 +211,7 @@
           <a:p>
             <a:fld id="{4AFF1A39-08FC-A241-8B97-468F53292083}" type="datetimeFigureOut">
               <a:rPr lang="en-US" smtClean="0"/>
-              <a:t>5/8/22</a:t>
+              <a:t>5/13/22</a:t>
             </a:fld>
             <a:endParaRPr lang="en-US"/>
           </a:p>
@@ -530,10 +530,7 @@
               <a:rPr lang="en-US" dirty="0" err="1"/>
               <a:t>simple_import.py</a:t>
             </a:r>
-            <a:r>
-              <a:rPr lang="en-US" dirty="0"/>
-              <a:t> </a:t>
-            </a:r>
+            <a:endParaRPr lang="en-US" dirty="0"/>
           </a:p>
         </p:txBody>
       </p:sp>
@@ -711,39 +708,7 @@
           <a:p>
             <a:r>
               <a:rPr lang="en-US" dirty="0"/>
-              <a:t>You should add an __</a:t>
-            </a:r>
-            <a:r>
-              <a:rPr lang="en-US" dirty="0" err="1"/>
-              <a:t>init</a:t>
-            </a:r>
-            <a:r>
-              <a:rPr lang="en-US" dirty="0"/>
-              <a:t>__.</a:t>
-            </a:r>
-            <a:r>
-              <a:rPr lang="en-US" dirty="0" err="1"/>
-              <a:t>py</a:t>
-            </a:r>
-            <a:r>
-              <a:rPr lang="en-US" dirty="0"/>
-              <a:t> file even if it’s blank to any directory that should be included in the installation/distribution process. Many algorithms for finding the sub-directories containing relevant code are based on the presence of an __</a:t>
-            </a:r>
-            <a:r>
-              <a:rPr lang="en-US" dirty="0" err="1"/>
-              <a:t>init</a:t>
-            </a:r>
-            <a:r>
-              <a:rPr lang="en-US" dirty="0"/>
-              <a:t>__.</a:t>
-            </a:r>
-            <a:r>
-              <a:rPr lang="en-US" dirty="0" err="1"/>
-              <a:t>py</a:t>
-            </a:r>
-            <a:r>
-              <a:rPr lang="en-US" dirty="0"/>
-              <a:t> file; even if one of these isn’t being used, it’s a useful indication that the given directory is a part of the package. </a:t>
+              <a:t>The variable __all__ will be described in a few of slides, but by convention (PEP 8) it goes at the very top of any Python file</a:t>
             </a:r>
           </a:p>
         </p:txBody>
@@ -765,7 +730,7 @@
           <a:p>
             <a:fld id="{BD0BF4AD-A0B8-A54B-BDEE-58CBE375DFB2}" type="slidenum">
               <a:rPr lang="en-US" smtClean="0"/>
-              <a:t>8</a:t>
+              <a:t>7</a:t>
             </a:fld>
             <a:endParaRPr lang="en-US"/>
           </a:p>
@@ -774,7 +739,7 @@
     </p:spTree>
     <p:extLst>
       <p:ext uri="{BB962C8B-B14F-4D97-AF65-F5344CB8AC3E}">
-        <p14:creationId xmlns:p14="http://schemas.microsoft.com/office/powerpoint/2010/main" val="3694391802"/>
+        <p14:creationId xmlns:p14="http://schemas.microsoft.com/office/powerpoint/2010/main" val="1946307315"/>
       </p:ext>
     </p:extLst>
   </p:cSld>
@@ -830,6 +795,125 @@
           <a:p>
             <a:r>
               <a:rPr lang="en-US" dirty="0"/>
+              <a:t>You should add an __</a:t>
+            </a:r>
+            <a:r>
+              <a:rPr lang="en-US" dirty="0" err="1"/>
+              <a:t>init</a:t>
+            </a:r>
+            <a:r>
+              <a:rPr lang="en-US" dirty="0"/>
+              <a:t>__.</a:t>
+            </a:r>
+            <a:r>
+              <a:rPr lang="en-US" dirty="0" err="1"/>
+              <a:t>py</a:t>
+            </a:r>
+            <a:r>
+              <a:rPr lang="en-US" dirty="0"/>
+              <a:t> file even if it’s blank to any directory that should be included in the installation/distribution process. Many algorithms for finding the sub-directories containing relevant code are based on the presence of an __</a:t>
+            </a:r>
+            <a:r>
+              <a:rPr lang="en-US" dirty="0" err="1"/>
+              <a:t>init</a:t>
+            </a:r>
+            <a:r>
+              <a:rPr lang="en-US" dirty="0"/>
+              <a:t>__.</a:t>
+            </a:r>
+            <a:r>
+              <a:rPr lang="en-US" dirty="0" err="1"/>
+              <a:t>py</a:t>
+            </a:r>
+            <a:r>
+              <a:rPr lang="en-US" dirty="0"/>
+              <a:t> file; even if one of these isn’t being used, it’s a useful indication that the given directory is a part of the package. </a:t>
+            </a:r>
+          </a:p>
+        </p:txBody>
+      </p:sp>
+      <p:sp>
+        <p:nvSpPr>
+          <p:cNvPr id="4" name="Slide Number Placeholder 3"/>
+          <p:cNvSpPr>
+            <a:spLocks noGrp="1"/>
+          </p:cNvSpPr>
+          <p:nvPr>
+            <p:ph type="sldNum" sz="quarter" idx="5"/>
+          </p:nvPr>
+        </p:nvSpPr>
+        <p:spPr/>
+        <p:txBody>
+          <a:bodyPr/>
+          <a:lstStyle/>
+          <a:p>
+            <a:fld id="{BD0BF4AD-A0B8-A54B-BDEE-58CBE375DFB2}" type="slidenum">
+              <a:rPr lang="en-US" smtClean="0"/>
+              <a:t>8</a:t>
+            </a:fld>
+            <a:endParaRPr lang="en-US"/>
+          </a:p>
+        </p:txBody>
+      </p:sp>
+    </p:spTree>
+    <p:extLst>
+      <p:ext uri="{BB962C8B-B14F-4D97-AF65-F5344CB8AC3E}">
+        <p14:creationId xmlns:p14="http://schemas.microsoft.com/office/powerpoint/2010/main" val="3694391802"/>
+      </p:ext>
+    </p:extLst>
+  </p:cSld>
+  <p:clrMapOvr>
+    <a:masterClrMapping/>
+  </p:clrMapOvr>
+</p:notes>
+</file>
+
+<file path=ppt/notesSlides/notesSlide5.xml><?xml version="1.0" encoding="utf-8"?>
+<p:notes xmlns:a="http://schemas.openxmlformats.org/drawingml/2006/main" xmlns:r="http://schemas.openxmlformats.org/officeDocument/2006/relationships" xmlns:p="http://schemas.openxmlformats.org/presentationml/2006/main">
+  <p:cSld>
+    <p:spTree>
+      <p:nvGrpSpPr>
+        <p:cNvPr id="1" name=""/>
+        <p:cNvGrpSpPr/>
+        <p:nvPr/>
+      </p:nvGrpSpPr>
+      <p:grpSpPr>
+        <a:xfrm>
+          <a:off x="0" y="0"/>
+          <a:ext cx="0" cy="0"/>
+          <a:chOff x="0" y="0"/>
+          <a:chExt cx="0" cy="0"/>
+        </a:xfrm>
+      </p:grpSpPr>
+      <p:sp>
+        <p:nvSpPr>
+          <p:cNvPr id="2" name="Slide Image Placeholder 1"/>
+          <p:cNvSpPr>
+            <a:spLocks noGrp="1" noRot="1" noChangeAspect="1"/>
+          </p:cNvSpPr>
+          <p:nvPr>
+            <p:ph type="sldImg"/>
+          </p:nvPr>
+        </p:nvSpPr>
+        <p:spPr/>
+      </p:sp>
+      <p:sp>
+        <p:nvSpPr>
+          <p:cNvPr id="3" name="Notes Placeholder 2"/>
+          <p:cNvSpPr>
+            <a:spLocks noGrp="1"/>
+          </p:cNvSpPr>
+          <p:nvPr>
+            <p:ph type="body" idx="1"/>
+          </p:nvPr>
+        </p:nvSpPr>
+        <p:spPr/>
+        <p:txBody>
+          <a:bodyPr/>
+          <a:lstStyle/>
+          <a:p>
+            <a:r>
+              <a:rPr lang="en-US" dirty="0"/>
               <a:t>If you try to use relative imports outside of a python package, it’ll raise an error. </a:t>
             </a:r>
           </a:p>
@@ -871,7 +955,7 @@
 </p:notes>
 </file>
 
-<file path=ppt/notesSlides/notesSlide5.xml><?xml version="1.0" encoding="utf-8"?>
+<file path=ppt/notesSlides/notesSlide6.xml><?xml version="1.0" encoding="utf-8"?>
 <p:notes xmlns:a="http://schemas.openxmlformats.org/drawingml/2006/main" xmlns:r="http://schemas.openxmlformats.org/officeDocument/2006/relationships" xmlns:p="http://schemas.openxmlformats.org/presentationml/2006/main">
   <p:cSld>
     <p:spTree>
@@ -1239,7 +1323,7 @@
           <a:p>
             <a:fld id="{51673806-0BCD-1F42-BAA8-2011034B3C6A}" type="datetimeFigureOut">
               <a:rPr lang="en-US" smtClean="0"/>
-              <a:t>5/8/22</a:t>
+              <a:t>5/13/22</a:t>
             </a:fld>
             <a:endParaRPr lang="en-US"/>
           </a:p>
@@ -1653,7 +1737,7 @@
           <a:p>
             <a:fld id="{51673806-0BCD-1F42-BAA8-2011034B3C6A}" type="datetimeFigureOut">
               <a:rPr lang="en-US" smtClean="0"/>
-              <a:t>5/8/22</a:t>
+              <a:t>5/13/22</a:t>
             </a:fld>
             <a:endParaRPr lang="en-US"/>
           </a:p>
@@ -1984,7 +2068,7 @@
           <a:p>
             <a:fld id="{51673806-0BCD-1F42-BAA8-2011034B3C6A}" type="datetimeFigureOut">
               <a:rPr lang="en-US" smtClean="0"/>
-              <a:t>5/8/22</a:t>
+              <a:t>5/13/22</a:t>
             </a:fld>
             <a:endParaRPr lang="en-US"/>
           </a:p>
@@ -2384,7 +2468,7 @@
           <a:p>
             <a:fld id="{51673806-0BCD-1F42-BAA8-2011034B3C6A}" type="datetimeFigureOut">
               <a:rPr lang="en-US" smtClean="0"/>
-              <a:t>5/8/22</a:t>
+              <a:t>5/13/22</a:t>
             </a:fld>
             <a:endParaRPr lang="en-US"/>
           </a:p>
@@ -2947,7 +3031,7 @@
           <a:p>
             <a:fld id="{51673806-0BCD-1F42-BAA8-2011034B3C6A}" type="datetimeFigureOut">
               <a:rPr lang="en-US" smtClean="0"/>
-              <a:t>5/8/22</a:t>
+              <a:t>5/13/22</a:t>
             </a:fld>
             <a:endParaRPr lang="en-US"/>
           </a:p>
@@ -3623,7 +3707,7 @@
           <a:p>
             <a:fld id="{51673806-0BCD-1F42-BAA8-2011034B3C6A}" type="datetimeFigureOut">
               <a:rPr lang="en-US" smtClean="0"/>
-              <a:t>5/8/22</a:t>
+              <a:t>5/13/22</a:t>
             </a:fld>
             <a:endParaRPr lang="en-US"/>
           </a:p>
@@ -4531,7 +4615,7 @@
           <a:p>
             <a:fld id="{51673806-0BCD-1F42-BAA8-2011034B3C6A}" type="datetimeFigureOut">
               <a:rPr lang="en-US" smtClean="0"/>
-              <a:t>5/8/22</a:t>
+              <a:t>5/13/22</a:t>
             </a:fld>
             <a:endParaRPr lang="en-US"/>
           </a:p>
@@ -4839,7 +4923,7 @@
           <a:p>
             <a:fld id="{51673806-0BCD-1F42-BAA8-2011034B3C6A}" type="datetimeFigureOut">
               <a:rPr lang="en-US" smtClean="0"/>
-              <a:t>5/8/22</a:t>
+              <a:t>5/13/22</a:t>
             </a:fld>
             <a:endParaRPr lang="en-US"/>
           </a:p>
@@ -5098,7 +5182,7 @@
           <a:p>
             <a:fld id="{51673806-0BCD-1F42-BAA8-2011034B3C6A}" type="datetimeFigureOut">
               <a:rPr lang="en-US" smtClean="0"/>
-              <a:t>5/8/22</a:t>
+              <a:t>5/13/22</a:t>
             </a:fld>
             <a:endParaRPr lang="en-US"/>
           </a:p>
@@ -5421,7 +5505,7 @@
           <a:p>
             <a:fld id="{51673806-0BCD-1F42-BAA8-2011034B3C6A}" type="datetimeFigureOut">
               <a:rPr lang="en-US" smtClean="0"/>
-              <a:t>5/8/22</a:t>
+              <a:t>5/13/22</a:t>
             </a:fld>
             <a:endParaRPr lang="en-US"/>
           </a:p>
@@ -5805,7 +5889,7 @@
           <a:p>
             <a:fld id="{51673806-0BCD-1F42-BAA8-2011034B3C6A}" type="datetimeFigureOut">
               <a:rPr lang="en-US" smtClean="0"/>
-              <a:t>5/8/22</a:t>
+              <a:t>5/13/22</a:t>
             </a:fld>
             <a:endParaRPr lang="en-US"/>
           </a:p>
@@ -6181,7 +6265,7 @@
           <a:p>
             <a:fld id="{51673806-0BCD-1F42-BAA8-2011034B3C6A}" type="datetimeFigureOut">
               <a:rPr lang="en-US" smtClean="0"/>
-              <a:t>5/8/22</a:t>
+              <a:t>5/13/22</a:t>
             </a:fld>
             <a:endParaRPr lang="en-US"/>
           </a:p>
@@ -6687,7 +6771,7 @@
           <a:p>
             <a:fld id="{51673806-0BCD-1F42-BAA8-2011034B3C6A}" type="datetimeFigureOut">
               <a:rPr lang="en-US" smtClean="0"/>
-              <a:t>5/8/22</a:t>
+              <a:t>5/13/22</a:t>
             </a:fld>
             <a:endParaRPr lang="en-US"/>
           </a:p>
@@ -6944,7 +7028,7 @@
           <a:p>
             <a:fld id="{51673806-0BCD-1F42-BAA8-2011034B3C6A}" type="datetimeFigureOut">
               <a:rPr lang="en-US" smtClean="0"/>
-              <a:t>5/8/22</a:t>
+              <a:t>5/13/22</a:t>
             </a:fld>
             <a:endParaRPr lang="en-US"/>
           </a:p>
@@ -7102,7 +7186,7 @@
           <a:p>
             <a:fld id="{51673806-0BCD-1F42-BAA8-2011034B3C6A}" type="datetimeFigureOut">
               <a:rPr lang="en-US" smtClean="0"/>
-              <a:t>5/8/22</a:t>
+              <a:t>5/13/22</a:t>
             </a:fld>
             <a:endParaRPr lang="en-US"/>
           </a:p>
@@ -7492,7 +7576,7 @@
           <a:p>
             <a:fld id="{51673806-0BCD-1F42-BAA8-2011034B3C6A}" type="datetimeFigureOut">
               <a:rPr lang="en-US" smtClean="0"/>
-              <a:t>5/8/22</a:t>
+              <a:t>5/13/22</a:t>
             </a:fld>
             <a:endParaRPr lang="en-US"/>
           </a:p>
@@ -7901,7 +7985,7 @@
           <a:p>
             <a:fld id="{51673806-0BCD-1F42-BAA8-2011034B3C6A}" type="datetimeFigureOut">
               <a:rPr lang="en-US" smtClean="0"/>
-              <a:t>5/8/22</a:t>
+              <a:t>5/13/22</a:t>
             </a:fld>
             <a:endParaRPr lang="en-US"/>
           </a:p>
@@ -8147,7 +8231,7 @@
             <a:fld id="{51673806-0BCD-1F42-BAA8-2011034B3C6A}" type="datetimeFigureOut">
               <a:rPr lang="en-US" smtClean="0"/>
               <a:pPr/>
-              <a:t>5/8/22</a:t>
+              <a:t>5/13/22</a:t>
             </a:fld>
             <a:endParaRPr lang="en-US" dirty="0"/>
           </a:p>
@@ -9311,20 +9395,20 @@
               <a:defRPr/>
             </a:pPr>
             <a:r>
+              <a:rPr lang="en-US" dirty="0" err="1"/>
+              <a:t>mypkg</a:t>
+            </a:r>
+            <a:r>
               <a:rPr lang="en-US" dirty="0"/>
-              <a:t>Pop Quiz: What is the value of </a:t>
-            </a:r>
-            <a:r>
-              <a:rPr lang="en-US" i="1" dirty="0" err="1"/>
-              <a:t>mypkg</a:t>
-            </a:r>
-            <a:r>
-              <a:rPr lang="en-US" i="1" dirty="0"/>
-              <a:t>.__all__</a:t>
+              <a:t>.__all__ = [“</a:t>
+            </a:r>
+            <a:r>
+              <a:rPr lang="en-US" dirty="0" err="1"/>
+              <a:t>readdata</a:t>
             </a:r>
             <a:r>
               <a:rPr lang="en-US" dirty="0"/>
-              <a:t>? </a:t>
+              <a:t>”, “polynomial”, “sinusoid”, “exponential”, …]</a:t>
             </a:r>
           </a:p>
         </p:txBody>
@@ -10145,7 +10229,12 @@
             <p:ph idx="1"/>
           </p:nvPr>
         </p:nvSpPr>
-        <p:spPr/>
+        <p:spPr>
+          <a:xfrm>
+            <a:off x="680321" y="2336872"/>
+            <a:ext cx="9613861" cy="4178227"/>
+          </a:xfrm>
+        </p:spPr>
         <p:txBody>
           <a:bodyPr/>
           <a:lstStyle/>
@@ -10260,7 +10349,7 @@
             </a:pPr>
             <a:r>
               <a:rPr lang="en-US" dirty="0"/>
-              <a:t>You never have to write that code again! Take a guess how a software engineer would describe repeatedly writing similar code </a:t>
+              <a:t>You never have to write that code again! Take a guess how a software engineer would describe repeatedly writing similar code, even taking just a few seconds to copy and paste</a:t>
             </a:r>
           </a:p>
         </p:txBody>
@@ -10327,9 +10416,16 @@
             <p:ph idx="1"/>
           </p:nvPr>
         </p:nvSpPr>
-        <p:spPr/>
-        <p:txBody>
-          <a:bodyPr/>
+        <p:spPr>
+          <a:xfrm>
+            <a:off x="680321" y="2336872"/>
+            <a:ext cx="9613861" cy="4267127"/>
+          </a:xfrm>
+        </p:spPr>
+        <p:txBody>
+          <a:bodyPr>
+            <a:normAutofit/>
+          </a:bodyPr>
           <a:lstStyle/>
           <a:p>
             <a:pPr marL="0" marR="0" lvl="0" indent="0" defTabSz="914400" eaLnBrk="1" fontAlgn="auto" latinLnBrk="0" hangingPunct="1">
@@ -10435,8 +10531,21 @@
             </a:pPr>
             <a:r>
               <a:rPr lang="en-US" dirty="0"/>
-              <a:t>You never have to write that code again! Take a guess how a software engineer would describe repeatedly writing similar code </a:t>
-            </a:r>
+              <a:t>You never have to write that code again! Take a guess how a software engineer would describe repeatedly writing similar code, even taking just a few seconds to copy and paste</a:t>
+            </a:r>
+          </a:p>
+          <a:p>
+            <a:pPr marL="0" lvl="0" indent="0">
+              <a:lnSpc>
+                <a:spcPct val="100000"/>
+              </a:lnSpc>
+              <a:spcBef>
+                <a:spcPts val="0"/>
+              </a:spcBef>
+              <a:buNone/>
+              <a:defRPr/>
+            </a:pPr>
+            <a:endParaRPr lang="en-US" dirty="0"/>
           </a:p>
           <a:p>
             <a:pPr marL="0" marR="0" lvl="0" indent="0" algn="ctr" defTabSz="914400" eaLnBrk="1" fontAlgn="auto" latinLnBrk="0" hangingPunct="1">
@@ -11519,7 +11628,7 @@
             </a:pPr>
             <a:r>
               <a:rPr lang="en-US" dirty="0"/>
-              <a:t>The file is always ran once </a:t>
+              <a:t>The file runs only once</a:t>
             </a:r>
           </a:p>
           <a:p>
@@ -12052,7 +12161,7 @@
           <p:nvPr/>
         </p:nvPicPr>
         <p:blipFill>
-          <a:blip r:embed="rId2">
+          <a:blip r:embed="rId3">
             <a:extLst>
               <a:ext uri="{28A0092B-C50C-407E-A947-70E740481C1C}">
                 <a14:useLocalDpi xmlns:a14="http://schemas.microsoft.com/office/drawing/2010/main" val="0"/>
@@ -12082,7 +12191,7 @@
           <p:nvPr/>
         </p:nvPicPr>
         <p:blipFill>
-          <a:blip r:embed="rId3">
+          <a:blip r:embed="rId4">
             <a:extLst>
               <a:ext uri="{28A0092B-C50C-407E-A947-70E740481C1C}">
                 <a14:useLocalDpi xmlns:a14="http://schemas.microsoft.com/office/drawing/2010/main" val="0"/>
@@ -12772,7 +12881,7 @@
             </a:r>
             <a:r>
               <a:rPr lang="en-US" dirty="0"/>
-              <a:t> files are often included to note that the contents of a directory are still an important part of the package. These directories often contain data files. </a:t>
+              <a:t> files are often included to note that the contents of a directory are still an important part of the package. These directories often contain, e.g., data files. </a:t>
             </a:r>
           </a:p>
         </p:txBody>

</xml_diff>